<commit_message>
Tuesday morning session: changes and corrections
</commit_message>
<xml_diff>
--- a/2018_sisg_1_6.pptx
+++ b/2018_sisg_1_6.pptx
@@ -242,14 +242,14 @@
           <a:effectLst/>
           <a:extLst>
             <a:ext uri="{909E8E84-426E-40dd-AFC4-6F175D3DCCD1}">
-              <a14:hiddenFill xmlns:a14="http://schemas.microsoft.com/office/drawing/2010/main" xmlns="">
+              <a14:hiddenFill xmlns="" xmlns:a14="http://schemas.microsoft.com/office/drawing/2010/main">
                 <a:solidFill>
                   <a:schemeClr val="accent1"/>
                 </a:solidFill>
               </a14:hiddenFill>
             </a:ext>
             <a:ext uri="{91240B29-F687-4f45-9708-019B960494DF}">
-              <a14:hiddenLine xmlns:a14="http://schemas.microsoft.com/office/drawing/2010/main" xmlns="" w="9525">
+              <a14:hiddenLine xmlns="" xmlns:a14="http://schemas.microsoft.com/office/drawing/2010/main" w="9525">
                 <a:solidFill>
                   <a:schemeClr val="tx1"/>
                 </a:solidFill>
@@ -259,7 +259,7 @@
               </a14:hiddenLine>
             </a:ext>
             <a:ext uri="{AF507438-7753-43e0-B8FC-AC1667EBCBE1}">
-              <a14:hiddenEffects xmlns:a14="http://schemas.microsoft.com/office/drawing/2010/main" xmlns="">
+              <a14:hiddenEffects xmlns="" xmlns:a14="http://schemas.microsoft.com/office/drawing/2010/main">
                 <a:effectLst>
                   <a:outerShdw dist="35921" dir="2700000" algn="ctr" rotWithShape="0">
                     <a:schemeClr val="bg2"/>
@@ -313,14 +313,14 @@
           <a:effectLst/>
           <a:extLst>
             <a:ext uri="{909E8E84-426E-40dd-AFC4-6F175D3DCCD1}">
-              <a14:hiddenFill xmlns:a14="http://schemas.microsoft.com/office/drawing/2010/main" xmlns="">
+              <a14:hiddenFill xmlns="" xmlns:a14="http://schemas.microsoft.com/office/drawing/2010/main">
                 <a:solidFill>
                   <a:schemeClr val="accent1"/>
                 </a:solidFill>
               </a14:hiddenFill>
             </a:ext>
             <a:ext uri="{91240B29-F687-4f45-9708-019B960494DF}">
-              <a14:hiddenLine xmlns:a14="http://schemas.microsoft.com/office/drawing/2010/main" xmlns="" w="9525">
+              <a14:hiddenLine xmlns="" xmlns:a14="http://schemas.microsoft.com/office/drawing/2010/main" w="9525">
                 <a:solidFill>
                   <a:schemeClr val="tx1"/>
                 </a:solidFill>
@@ -330,7 +330,7 @@
               </a14:hiddenLine>
             </a:ext>
             <a:ext uri="{AF507438-7753-43e0-B8FC-AC1667EBCBE1}">
-              <a14:hiddenEffects xmlns:a14="http://schemas.microsoft.com/office/drawing/2010/main" xmlns="">
+              <a14:hiddenEffects xmlns="" xmlns:a14="http://schemas.microsoft.com/office/drawing/2010/main">
                 <a:effectLst>
                   <a:outerShdw dist="35921" dir="2700000" algn="ctr" rotWithShape="0">
                     <a:schemeClr val="bg2"/>
@@ -384,14 +384,14 @@
           <a:effectLst/>
           <a:extLst>
             <a:ext uri="{909E8E84-426E-40dd-AFC4-6F175D3DCCD1}">
-              <a14:hiddenFill xmlns:a14="http://schemas.microsoft.com/office/drawing/2010/main" xmlns="">
+              <a14:hiddenFill xmlns="" xmlns:a14="http://schemas.microsoft.com/office/drawing/2010/main">
                 <a:solidFill>
                   <a:schemeClr val="accent1"/>
                 </a:solidFill>
               </a14:hiddenFill>
             </a:ext>
             <a:ext uri="{91240B29-F687-4f45-9708-019B960494DF}">
-              <a14:hiddenLine xmlns:a14="http://schemas.microsoft.com/office/drawing/2010/main" xmlns="" w="9525">
+              <a14:hiddenLine xmlns="" xmlns:a14="http://schemas.microsoft.com/office/drawing/2010/main" w="9525">
                 <a:solidFill>
                   <a:schemeClr val="tx1"/>
                 </a:solidFill>
@@ -401,7 +401,7 @@
               </a14:hiddenLine>
             </a:ext>
             <a:ext uri="{AF507438-7753-43e0-B8FC-AC1667EBCBE1}">
-              <a14:hiddenEffects xmlns:a14="http://schemas.microsoft.com/office/drawing/2010/main" xmlns="">
+              <a14:hiddenEffects xmlns="" xmlns:a14="http://schemas.microsoft.com/office/drawing/2010/main">
                 <a:effectLst>
                   <a:outerShdw dist="35921" dir="2700000" algn="ctr" rotWithShape="0">
                     <a:schemeClr val="bg2"/>
@@ -455,14 +455,14 @@
           <a:effectLst/>
           <a:extLst>
             <a:ext uri="{909E8E84-426E-40dd-AFC4-6F175D3DCCD1}">
-              <a14:hiddenFill xmlns:a14="http://schemas.microsoft.com/office/drawing/2010/main" xmlns="">
+              <a14:hiddenFill xmlns="" xmlns:a14="http://schemas.microsoft.com/office/drawing/2010/main">
                 <a:solidFill>
                   <a:schemeClr val="accent1"/>
                 </a:solidFill>
               </a14:hiddenFill>
             </a:ext>
             <a:ext uri="{91240B29-F687-4f45-9708-019B960494DF}">
-              <a14:hiddenLine xmlns:a14="http://schemas.microsoft.com/office/drawing/2010/main" xmlns="" w="9525">
+              <a14:hiddenLine xmlns="" xmlns:a14="http://schemas.microsoft.com/office/drawing/2010/main" w="9525">
                 <a:solidFill>
                   <a:schemeClr val="tx1"/>
                 </a:solidFill>
@@ -472,7 +472,7 @@
               </a14:hiddenLine>
             </a:ext>
             <a:ext uri="{AF507438-7753-43e0-B8FC-AC1667EBCBE1}">
-              <a14:hiddenEffects xmlns:a14="http://schemas.microsoft.com/office/drawing/2010/main" xmlns="">
+              <a14:hiddenEffects xmlns="" xmlns:a14="http://schemas.microsoft.com/office/drawing/2010/main">
                 <a:effectLst>
                   <a:outerShdw dist="35921" dir="2700000" algn="ctr" rotWithShape="0">
                     <a:schemeClr val="bg2"/>
@@ -569,14 +569,14 @@
           <a:effectLst/>
           <a:extLst>
             <a:ext uri="{909E8E84-426E-40dd-AFC4-6F175D3DCCD1}">
-              <a14:hiddenFill xmlns:a14="http://schemas.microsoft.com/office/drawing/2010/main" xmlns="">
+              <a14:hiddenFill xmlns="" xmlns:a14="http://schemas.microsoft.com/office/drawing/2010/main">
                 <a:solidFill>
                   <a:schemeClr val="accent1"/>
                 </a:solidFill>
               </a14:hiddenFill>
             </a:ext>
             <a:ext uri="{91240B29-F687-4f45-9708-019B960494DF}">
-              <a14:hiddenLine xmlns:a14="http://schemas.microsoft.com/office/drawing/2010/main" xmlns="" w="9525">
+              <a14:hiddenLine xmlns="" xmlns:a14="http://schemas.microsoft.com/office/drawing/2010/main" w="9525">
                 <a:solidFill>
                   <a:schemeClr val="tx1"/>
                 </a:solidFill>
@@ -586,7 +586,7 @@
               </a14:hiddenLine>
             </a:ext>
             <a:ext uri="{AF507438-7753-43e0-B8FC-AC1667EBCBE1}">
-              <a14:hiddenEffects xmlns:a14="http://schemas.microsoft.com/office/drawing/2010/main" xmlns="">
+              <a14:hiddenEffects xmlns="" xmlns:a14="http://schemas.microsoft.com/office/drawing/2010/main">
                 <a:effectLst>
                   <a:outerShdw dist="35921" dir="2700000" algn="ctr" rotWithShape="0">
                     <a:schemeClr val="bg2"/>
@@ -640,14 +640,14 @@
           <a:effectLst/>
           <a:extLst>
             <a:ext uri="{909E8E84-426E-40dd-AFC4-6F175D3DCCD1}">
-              <a14:hiddenFill xmlns:a14="http://schemas.microsoft.com/office/drawing/2010/main" xmlns="">
+              <a14:hiddenFill xmlns="" xmlns:a14="http://schemas.microsoft.com/office/drawing/2010/main">
                 <a:solidFill>
                   <a:schemeClr val="accent1"/>
                 </a:solidFill>
               </a14:hiddenFill>
             </a:ext>
             <a:ext uri="{91240B29-F687-4f45-9708-019B960494DF}">
-              <a14:hiddenLine xmlns:a14="http://schemas.microsoft.com/office/drawing/2010/main" xmlns="" w="9525">
+              <a14:hiddenLine xmlns="" xmlns:a14="http://schemas.microsoft.com/office/drawing/2010/main" w="9525">
                 <a:solidFill>
                   <a:schemeClr val="tx1"/>
                 </a:solidFill>
@@ -657,7 +657,7 @@
               </a14:hiddenLine>
             </a:ext>
             <a:ext uri="{AF507438-7753-43e0-B8FC-AC1667EBCBE1}">
-              <a14:hiddenEffects xmlns:a14="http://schemas.microsoft.com/office/drawing/2010/main" xmlns="">
+              <a14:hiddenEffects xmlns="" xmlns:a14="http://schemas.microsoft.com/office/drawing/2010/main">
                 <a:effectLst>
                   <a:outerShdw dist="35921" dir="2700000" algn="ctr" rotWithShape="0">
                     <a:schemeClr val="bg2"/>
@@ -716,14 +716,14 @@
           <a:effectLst/>
           <a:extLst>
             <a:ext uri="{909E8E84-426E-40dd-AFC4-6F175D3DCCD1}">
-              <a14:hiddenFill xmlns:a14="http://schemas.microsoft.com/office/drawing/2010/main" xmlns="">
+              <a14:hiddenFill xmlns="" xmlns:a14="http://schemas.microsoft.com/office/drawing/2010/main">
                 <a:solidFill>
                   <a:srgbClr val="FFFFFF"/>
                 </a:solidFill>
               </a14:hiddenFill>
             </a:ext>
             <a:ext uri="{AF507438-7753-43e0-B8FC-AC1667EBCBE1}">
-              <a14:hiddenEffects xmlns:a14="http://schemas.microsoft.com/office/drawing/2010/main" xmlns="">
+              <a14:hiddenEffects xmlns="" xmlns:a14="http://schemas.microsoft.com/office/drawing/2010/main">
                 <a:effectLst>
                   <a:outerShdw dist="35921" dir="2700000" algn="ctr" rotWithShape="0">
                     <a:srgbClr val="808080"/>
@@ -732,7 +732,7 @@
               </a14:hiddenEffects>
             </a:ext>
             <a:ext uri="{53640926-AAD7-44d8-BBD7-CCE9431645EC}">
-              <a14:shadowObscured xmlns:a14="http://schemas.microsoft.com/office/drawing/2010/main" xmlns="" val="1"/>
+              <a14:shadowObscured xmlns="" xmlns:a14="http://schemas.microsoft.com/office/drawing/2010/main" val="1"/>
             </a:ext>
           </a:extLst>
         </p:spPr>
@@ -762,14 +762,14 @@
           <a:effectLst/>
           <a:extLst>
             <a:ext uri="{909E8E84-426E-40dd-AFC4-6F175D3DCCD1}">
-              <a14:hiddenFill xmlns:a14="http://schemas.microsoft.com/office/drawing/2010/main" xmlns="">
+              <a14:hiddenFill xmlns="" xmlns:a14="http://schemas.microsoft.com/office/drawing/2010/main">
                 <a:solidFill>
                   <a:schemeClr val="accent1"/>
                 </a:solidFill>
               </a14:hiddenFill>
             </a:ext>
             <a:ext uri="{91240B29-F687-4f45-9708-019B960494DF}">
-              <a14:hiddenLine xmlns:a14="http://schemas.microsoft.com/office/drawing/2010/main" xmlns="" w="9525">
+              <a14:hiddenLine xmlns="" xmlns:a14="http://schemas.microsoft.com/office/drawing/2010/main" w="9525">
                 <a:solidFill>
                   <a:schemeClr val="tx1"/>
                 </a:solidFill>
@@ -779,7 +779,7 @@
               </a14:hiddenLine>
             </a:ext>
             <a:ext uri="{AF507438-7753-43e0-B8FC-AC1667EBCBE1}">
-              <a14:hiddenEffects xmlns:a14="http://schemas.microsoft.com/office/drawing/2010/main" xmlns="">
+              <a14:hiddenEffects xmlns="" xmlns:a14="http://schemas.microsoft.com/office/drawing/2010/main">
                 <a:effectLst>
                   <a:outerShdw dist="35921" dir="2700000" algn="ctr" rotWithShape="0">
                     <a:schemeClr val="bg2"/>
@@ -858,14 +858,14 @@
           <a:effectLst/>
           <a:extLst>
             <a:ext uri="{909E8E84-426E-40dd-AFC4-6F175D3DCCD1}">
-              <a14:hiddenFill xmlns:a14="http://schemas.microsoft.com/office/drawing/2010/main" xmlns="">
+              <a14:hiddenFill xmlns="" xmlns:a14="http://schemas.microsoft.com/office/drawing/2010/main">
                 <a:solidFill>
                   <a:schemeClr val="accent1"/>
                 </a:solidFill>
               </a14:hiddenFill>
             </a:ext>
             <a:ext uri="{91240B29-F687-4f45-9708-019B960494DF}">
-              <a14:hiddenLine xmlns:a14="http://schemas.microsoft.com/office/drawing/2010/main" xmlns="" w="9525">
+              <a14:hiddenLine xmlns="" xmlns:a14="http://schemas.microsoft.com/office/drawing/2010/main" w="9525">
                 <a:solidFill>
                   <a:schemeClr val="tx1"/>
                 </a:solidFill>
@@ -875,7 +875,7 @@
               </a14:hiddenLine>
             </a:ext>
             <a:ext uri="{AF507438-7753-43e0-B8FC-AC1667EBCBE1}">
-              <a14:hiddenEffects xmlns:a14="http://schemas.microsoft.com/office/drawing/2010/main" xmlns="">
+              <a14:hiddenEffects xmlns="" xmlns:a14="http://schemas.microsoft.com/office/drawing/2010/main">
                 <a:effectLst>
                   <a:outerShdw dist="35921" dir="2700000" algn="ctr" rotWithShape="0">
                     <a:schemeClr val="bg2"/>
@@ -929,14 +929,14 @@
           <a:effectLst/>
           <a:extLst>
             <a:ext uri="{909E8E84-426E-40dd-AFC4-6F175D3DCCD1}">
-              <a14:hiddenFill xmlns:a14="http://schemas.microsoft.com/office/drawing/2010/main" xmlns="">
+              <a14:hiddenFill xmlns="" xmlns:a14="http://schemas.microsoft.com/office/drawing/2010/main">
                 <a:solidFill>
                   <a:schemeClr val="accent1"/>
                 </a:solidFill>
               </a14:hiddenFill>
             </a:ext>
             <a:ext uri="{91240B29-F687-4f45-9708-019B960494DF}">
-              <a14:hiddenLine xmlns:a14="http://schemas.microsoft.com/office/drawing/2010/main" xmlns="" w="9525">
+              <a14:hiddenLine xmlns="" xmlns:a14="http://schemas.microsoft.com/office/drawing/2010/main" w="9525">
                 <a:solidFill>
                   <a:schemeClr val="tx1"/>
                 </a:solidFill>
@@ -946,7 +946,7 @@
               </a14:hiddenLine>
             </a:ext>
             <a:ext uri="{AF507438-7753-43e0-B8FC-AC1667EBCBE1}">
-              <a14:hiddenEffects xmlns:a14="http://schemas.microsoft.com/office/drawing/2010/main" xmlns="">
+              <a14:hiddenEffects xmlns="" xmlns:a14="http://schemas.microsoft.com/office/drawing/2010/main">
                 <a:effectLst>
                   <a:outerShdw dist="35921" dir="2700000" algn="ctr" rotWithShape="0">
                     <a:schemeClr val="bg2"/>
@@ -3898,14 +3898,14 @@
           <a:effectLst/>
           <a:extLst>
             <a:ext uri="{909E8E84-426E-40dd-AFC4-6F175D3DCCD1}">
-              <a14:hiddenFill xmlns:a14="http://schemas.microsoft.com/office/drawing/2010/main" xmlns="">
+              <a14:hiddenFill xmlns="" xmlns:a14="http://schemas.microsoft.com/office/drawing/2010/main">
                 <a:solidFill>
                   <a:schemeClr val="accent1"/>
                 </a:solidFill>
               </a14:hiddenFill>
             </a:ext>
             <a:ext uri="{91240B29-F687-4f45-9708-019B960494DF}">
-              <a14:hiddenLine xmlns:a14="http://schemas.microsoft.com/office/drawing/2010/main" xmlns="" w="9525">
+              <a14:hiddenLine xmlns="" xmlns:a14="http://schemas.microsoft.com/office/drawing/2010/main" w="9525">
                 <a:solidFill>
                   <a:schemeClr val="tx1"/>
                 </a:solidFill>
@@ -3915,7 +3915,7 @@
               </a14:hiddenLine>
             </a:ext>
             <a:ext uri="{AF507438-7753-43e0-B8FC-AC1667EBCBE1}">
-              <a14:hiddenEffects xmlns:a14="http://schemas.microsoft.com/office/drawing/2010/main" xmlns="">
+              <a14:hiddenEffects xmlns="" xmlns:a14="http://schemas.microsoft.com/office/drawing/2010/main">
                 <a:effectLst>
                   <a:outerShdw dist="35921" dir="2700000" algn="ctr" rotWithShape="0">
                     <a:schemeClr val="bg2"/>
@@ -3966,14 +3966,14 @@
           <a:effectLst/>
           <a:extLst>
             <a:ext uri="{909E8E84-426E-40dd-AFC4-6F175D3DCCD1}">
-              <a14:hiddenFill xmlns:a14="http://schemas.microsoft.com/office/drawing/2010/main" xmlns="">
+              <a14:hiddenFill xmlns="" xmlns:a14="http://schemas.microsoft.com/office/drawing/2010/main">
                 <a:solidFill>
                   <a:schemeClr val="accent1"/>
                 </a:solidFill>
               </a14:hiddenFill>
             </a:ext>
             <a:ext uri="{91240B29-F687-4f45-9708-019B960494DF}">
-              <a14:hiddenLine xmlns:a14="http://schemas.microsoft.com/office/drawing/2010/main" xmlns="" w="9525">
+              <a14:hiddenLine xmlns="" xmlns:a14="http://schemas.microsoft.com/office/drawing/2010/main" w="9525">
                 <a:solidFill>
                   <a:schemeClr val="tx1"/>
                 </a:solidFill>
@@ -3983,7 +3983,7 @@
               </a14:hiddenLine>
             </a:ext>
             <a:ext uri="{AF507438-7753-43e0-B8FC-AC1667EBCBE1}">
-              <a14:hiddenEffects xmlns:a14="http://schemas.microsoft.com/office/drawing/2010/main" xmlns="">
+              <a14:hiddenEffects xmlns="" xmlns:a14="http://schemas.microsoft.com/office/drawing/2010/main">
                 <a:effectLst>
                   <a:outerShdw dist="35921" dir="2700000" algn="ctr" rotWithShape="0">
                     <a:schemeClr val="bg2"/>
@@ -4062,14 +4062,14 @@
           <a:effectLst/>
           <a:extLst>
             <a:ext uri="{909E8E84-426E-40dd-AFC4-6F175D3DCCD1}">
-              <a14:hiddenFill xmlns:a14="http://schemas.microsoft.com/office/drawing/2010/main" xmlns="">
+              <a14:hiddenFill xmlns="" xmlns:a14="http://schemas.microsoft.com/office/drawing/2010/main">
                 <a:solidFill>
                   <a:schemeClr val="accent1"/>
                 </a:solidFill>
               </a14:hiddenFill>
             </a:ext>
             <a:ext uri="{91240B29-F687-4f45-9708-019B960494DF}">
-              <a14:hiddenLine xmlns:a14="http://schemas.microsoft.com/office/drawing/2010/main" xmlns="" w="9525">
+              <a14:hiddenLine xmlns="" xmlns:a14="http://schemas.microsoft.com/office/drawing/2010/main" w="9525">
                 <a:solidFill>
                   <a:schemeClr val="tx1"/>
                 </a:solidFill>
@@ -4079,7 +4079,7 @@
               </a14:hiddenLine>
             </a:ext>
             <a:ext uri="{AF507438-7753-43e0-B8FC-AC1667EBCBE1}">
-              <a14:hiddenEffects xmlns:a14="http://schemas.microsoft.com/office/drawing/2010/main" xmlns="">
+              <a14:hiddenEffects xmlns="" xmlns:a14="http://schemas.microsoft.com/office/drawing/2010/main">
                 <a:effectLst>
                   <a:outerShdw dist="35921" dir="2700000" algn="ctr" rotWithShape="0">
                     <a:schemeClr val="bg2"/>
@@ -4137,14 +4137,14 @@
           <a:effectLst/>
           <a:extLst>
             <a:ext uri="{909E8E84-426E-40dd-AFC4-6F175D3DCCD1}">
-              <a14:hiddenFill xmlns:a14="http://schemas.microsoft.com/office/drawing/2010/main" xmlns="">
+              <a14:hiddenFill xmlns="" xmlns:a14="http://schemas.microsoft.com/office/drawing/2010/main">
                 <a:solidFill>
                   <a:schemeClr val="accent1"/>
                 </a:solidFill>
               </a14:hiddenFill>
             </a:ext>
             <a:ext uri="{91240B29-F687-4f45-9708-019B960494DF}">
-              <a14:hiddenLine xmlns:a14="http://schemas.microsoft.com/office/drawing/2010/main" xmlns="" w="9525">
+              <a14:hiddenLine xmlns="" xmlns:a14="http://schemas.microsoft.com/office/drawing/2010/main" w="9525">
                 <a:solidFill>
                   <a:schemeClr val="tx1"/>
                 </a:solidFill>
@@ -4154,7 +4154,7 @@
               </a14:hiddenLine>
             </a:ext>
             <a:ext uri="{AF507438-7753-43e0-B8FC-AC1667EBCBE1}">
-              <a14:hiddenEffects xmlns:a14="http://schemas.microsoft.com/office/drawing/2010/main" xmlns="">
+              <a14:hiddenEffects xmlns="" xmlns:a14="http://schemas.microsoft.com/office/drawing/2010/main">
                 <a:effectLst>
                   <a:outerShdw dist="35921" dir="2700000" algn="ctr" rotWithShape="0">
                     <a:schemeClr val="bg2"/>
@@ -4212,14 +4212,14 @@
           <a:effectLst/>
           <a:extLst>
             <a:ext uri="{909E8E84-426E-40dd-AFC4-6F175D3DCCD1}">
-              <a14:hiddenFill xmlns:a14="http://schemas.microsoft.com/office/drawing/2010/main" xmlns="">
+              <a14:hiddenFill xmlns="" xmlns:a14="http://schemas.microsoft.com/office/drawing/2010/main">
                 <a:solidFill>
                   <a:schemeClr val="accent1"/>
                 </a:solidFill>
               </a14:hiddenFill>
             </a:ext>
             <a:ext uri="{91240B29-F687-4f45-9708-019B960494DF}">
-              <a14:hiddenLine xmlns:a14="http://schemas.microsoft.com/office/drawing/2010/main" xmlns="" w="9525">
+              <a14:hiddenLine xmlns="" xmlns:a14="http://schemas.microsoft.com/office/drawing/2010/main" w="9525">
                 <a:solidFill>
                   <a:schemeClr val="tx1"/>
                 </a:solidFill>
@@ -4229,7 +4229,7 @@
               </a14:hiddenLine>
             </a:ext>
             <a:ext uri="{AF507438-7753-43e0-B8FC-AC1667EBCBE1}">
-              <a14:hiddenEffects xmlns:a14="http://schemas.microsoft.com/office/drawing/2010/main" xmlns="">
+              <a14:hiddenEffects xmlns="" xmlns:a14="http://schemas.microsoft.com/office/drawing/2010/main">
                 <a:effectLst>
                   <a:outerShdw dist="35921" dir="2700000" algn="ctr" rotWithShape="0">
                     <a:schemeClr val="bg2"/>
@@ -4295,14 +4295,14 @@
           <a:effectLst/>
           <a:extLst>
             <a:ext uri="{909E8E84-426E-40dd-AFC4-6F175D3DCCD1}">
-              <a14:hiddenFill xmlns:a14="http://schemas.microsoft.com/office/drawing/2010/main" xmlns="">
+              <a14:hiddenFill xmlns="" xmlns:a14="http://schemas.microsoft.com/office/drawing/2010/main">
                 <a:solidFill>
                   <a:schemeClr val="accent1"/>
                 </a:solidFill>
               </a14:hiddenFill>
             </a:ext>
             <a:ext uri="{AF507438-7753-43e0-B8FC-AC1667EBCBE1}">
-              <a14:hiddenEffects xmlns:a14="http://schemas.microsoft.com/office/drawing/2010/main" xmlns="">
+              <a14:hiddenEffects xmlns="" xmlns:a14="http://schemas.microsoft.com/office/drawing/2010/main">
                 <a:effectLst>
                   <a:outerShdw dist="35921" dir="2700000" algn="ctr" rotWithShape="0">
                     <a:schemeClr val="bg2"/>
@@ -5112,14 +5112,14 @@
           <a:effectLst/>
           <a:extLst>
             <a:ext uri="{909E8E84-426E-40dd-AFC4-6F175D3DCCD1}">
-              <a14:hiddenFill xmlns:a14="http://schemas.microsoft.com/office/drawing/2010/main" xmlns="">
+              <a14:hiddenFill xmlns="" xmlns:a14="http://schemas.microsoft.com/office/drawing/2010/main">
                 <a:solidFill>
                   <a:schemeClr val="accent1"/>
                 </a:solidFill>
               </a14:hiddenFill>
             </a:ext>
             <a:ext uri="{91240B29-F687-4f45-9708-019B960494DF}">
-              <a14:hiddenLine xmlns:a14="http://schemas.microsoft.com/office/drawing/2010/main" xmlns="" w="38100" cmpd="dbl">
+              <a14:hiddenLine xmlns="" xmlns:a14="http://schemas.microsoft.com/office/drawing/2010/main" w="38100" cmpd="dbl">
                 <a:solidFill>
                   <a:schemeClr val="tx1"/>
                 </a:solidFill>
@@ -5129,7 +5129,7 @@
               </a14:hiddenLine>
             </a:ext>
             <a:ext uri="{AF507438-7753-43e0-B8FC-AC1667EBCBE1}">
-              <a14:hiddenEffects xmlns:a14="http://schemas.microsoft.com/office/drawing/2010/main" xmlns="">
+              <a14:hiddenEffects xmlns="" xmlns:a14="http://schemas.microsoft.com/office/drawing/2010/main">
                 <a:effectLst>
                   <a:outerShdw dist="35921" dir="2700000" algn="ctr" rotWithShape="0">
                     <a:schemeClr val="bg2"/>
@@ -5279,12 +5279,12 @@
           <a:effectLst/>
           <a:extLst>
             <a:ext uri="{909E8E84-426E-40dd-AFC4-6F175D3DCCD1}">
-              <a14:hiddenFill xmlns:a14="http://schemas.microsoft.com/office/drawing/2010/main" xmlns="">
+              <a14:hiddenFill xmlns="" xmlns:a14="http://schemas.microsoft.com/office/drawing/2010/main">
                 <a:noFill/>
               </a14:hiddenFill>
             </a:ext>
             <a:ext uri="{AF507438-7753-43e0-B8FC-AC1667EBCBE1}">
-              <a14:hiddenEffects xmlns:a14="http://schemas.microsoft.com/office/drawing/2010/main" xmlns="">
+              <a14:hiddenEffects xmlns="" xmlns:a14="http://schemas.microsoft.com/office/drawing/2010/main">
                 <a:effectLst>
                   <a:outerShdw dist="35921" dir="2700000" algn="ctr" rotWithShape="0">
                     <a:schemeClr val="bg2"/>
@@ -5330,12 +5330,12 @@
           <a:effectLst/>
           <a:extLst>
             <a:ext uri="{909E8E84-426E-40dd-AFC4-6F175D3DCCD1}">
-              <a14:hiddenFill xmlns:a14="http://schemas.microsoft.com/office/drawing/2010/main" xmlns="">
+              <a14:hiddenFill xmlns="" xmlns:a14="http://schemas.microsoft.com/office/drawing/2010/main">
                 <a:noFill/>
               </a14:hiddenFill>
             </a:ext>
             <a:ext uri="{AF507438-7753-43e0-B8FC-AC1667EBCBE1}">
-              <a14:hiddenEffects xmlns:a14="http://schemas.microsoft.com/office/drawing/2010/main" xmlns="">
+              <a14:hiddenEffects xmlns="" xmlns:a14="http://schemas.microsoft.com/office/drawing/2010/main">
                 <a:effectLst>
                   <a:outerShdw dist="35921" dir="2700000" algn="ctr" rotWithShape="0">
                     <a:schemeClr val="bg2"/>
@@ -5381,12 +5381,12 @@
           <a:effectLst/>
           <a:extLst>
             <a:ext uri="{909E8E84-426E-40dd-AFC4-6F175D3DCCD1}">
-              <a14:hiddenFill xmlns:a14="http://schemas.microsoft.com/office/drawing/2010/main" xmlns="">
+              <a14:hiddenFill xmlns="" xmlns:a14="http://schemas.microsoft.com/office/drawing/2010/main">
                 <a:noFill/>
               </a14:hiddenFill>
             </a:ext>
             <a:ext uri="{AF507438-7753-43e0-B8FC-AC1667EBCBE1}">
-              <a14:hiddenEffects xmlns:a14="http://schemas.microsoft.com/office/drawing/2010/main" xmlns="">
+              <a14:hiddenEffects xmlns="" xmlns:a14="http://schemas.microsoft.com/office/drawing/2010/main">
                 <a:effectLst>
                   <a:outerShdw dist="35921" dir="2700000" algn="ctr" rotWithShape="0">
                     <a:schemeClr val="bg2"/>
@@ -5432,12 +5432,12 @@
           <a:effectLst/>
           <a:extLst>
             <a:ext uri="{909E8E84-426E-40dd-AFC4-6F175D3DCCD1}">
-              <a14:hiddenFill xmlns:a14="http://schemas.microsoft.com/office/drawing/2010/main" xmlns="">
+              <a14:hiddenFill xmlns="" xmlns:a14="http://schemas.microsoft.com/office/drawing/2010/main">
                 <a:noFill/>
               </a14:hiddenFill>
             </a:ext>
             <a:ext uri="{AF507438-7753-43e0-B8FC-AC1667EBCBE1}">
-              <a14:hiddenEffects xmlns:a14="http://schemas.microsoft.com/office/drawing/2010/main" xmlns="">
+              <a14:hiddenEffects xmlns="" xmlns:a14="http://schemas.microsoft.com/office/drawing/2010/main">
                 <a:effectLst>
                   <a:outerShdw dist="35921" dir="2700000" algn="ctr" rotWithShape="0">
                     <a:schemeClr val="bg2"/>
@@ -5876,14 +5876,14 @@
           <a:effectLst/>
           <a:extLst>
             <a:ext uri="{909E8E84-426E-40dd-AFC4-6F175D3DCCD1}">
-              <a14:hiddenFill xmlns:a14="http://schemas.microsoft.com/office/drawing/2010/main" xmlns="">
+              <a14:hiddenFill xmlns="" xmlns:a14="http://schemas.microsoft.com/office/drawing/2010/main">
                 <a:solidFill>
                   <a:schemeClr val="accent1"/>
                 </a:solidFill>
               </a14:hiddenFill>
             </a:ext>
             <a:ext uri="{91240B29-F687-4f45-9708-019B960494DF}">
-              <a14:hiddenLine xmlns:a14="http://schemas.microsoft.com/office/drawing/2010/main" xmlns="" w="9525">
+              <a14:hiddenLine xmlns="" xmlns:a14="http://schemas.microsoft.com/office/drawing/2010/main" w="9525">
                 <a:solidFill>
                   <a:schemeClr val="tx1"/>
                 </a:solidFill>
@@ -5893,7 +5893,7 @@
               </a14:hiddenLine>
             </a:ext>
             <a:ext uri="{AF507438-7753-43e0-B8FC-AC1667EBCBE1}">
-              <a14:hiddenEffects xmlns:a14="http://schemas.microsoft.com/office/drawing/2010/main" xmlns="">
+              <a14:hiddenEffects xmlns="" xmlns:a14="http://schemas.microsoft.com/office/drawing/2010/main">
                 <a:effectLst>
                   <a:outerShdw dist="35921" dir="2700000" algn="ctr" rotWithShape="0">
                     <a:schemeClr val="bg2"/>
@@ -6046,12 +6046,12 @@
           <a:effectLst/>
           <a:extLst>
             <a:ext uri="{909E8E84-426E-40dd-AFC4-6F175D3DCCD1}">
-              <a14:hiddenFill xmlns:a14="http://schemas.microsoft.com/office/drawing/2010/main" xmlns="">
+              <a14:hiddenFill xmlns="" xmlns:a14="http://schemas.microsoft.com/office/drawing/2010/main">
                 <a:noFill/>
               </a14:hiddenFill>
             </a:ext>
             <a:ext uri="{AF507438-7753-43e0-B8FC-AC1667EBCBE1}">
-              <a14:hiddenEffects xmlns:a14="http://schemas.microsoft.com/office/drawing/2010/main" xmlns="">
+              <a14:hiddenEffects xmlns="" xmlns:a14="http://schemas.microsoft.com/office/drawing/2010/main">
                 <a:effectLst>
                   <a:outerShdw dist="35921" dir="2700000" algn="ctr" rotWithShape="0">
                     <a:schemeClr val="bg2"/>
@@ -6092,14 +6092,14 @@
           <a:effectLst/>
           <a:extLst>
             <a:ext uri="{909E8E84-426E-40dd-AFC4-6F175D3DCCD1}">
-              <a14:hiddenFill xmlns:a14="http://schemas.microsoft.com/office/drawing/2010/main" xmlns="">
+              <a14:hiddenFill xmlns="" xmlns:a14="http://schemas.microsoft.com/office/drawing/2010/main">
                 <a:solidFill>
                   <a:schemeClr val="accent1"/>
                 </a:solidFill>
               </a14:hiddenFill>
             </a:ext>
             <a:ext uri="{91240B29-F687-4f45-9708-019B960494DF}">
-              <a14:hiddenLine xmlns:a14="http://schemas.microsoft.com/office/drawing/2010/main" xmlns="" w="9525">
+              <a14:hiddenLine xmlns="" xmlns:a14="http://schemas.microsoft.com/office/drawing/2010/main" w="9525">
                 <a:solidFill>
                   <a:schemeClr val="tx1"/>
                 </a:solidFill>
@@ -6109,7 +6109,7 @@
               </a14:hiddenLine>
             </a:ext>
             <a:ext uri="{AF507438-7753-43e0-B8FC-AC1667EBCBE1}">
-              <a14:hiddenEffects xmlns:a14="http://schemas.microsoft.com/office/drawing/2010/main" xmlns="">
+              <a14:hiddenEffects xmlns="" xmlns:a14="http://schemas.microsoft.com/office/drawing/2010/main">
                 <a:effectLst>
                   <a:outerShdw dist="35921" dir="2700000" algn="ctr" rotWithShape="0">
                     <a:schemeClr val="bg2"/>
@@ -6356,7 +6356,7 @@
           <a:graphicData uri="http://schemas.openxmlformats.org/presentationml/2006/ole">
             <mc:AlternateContent xmlns:mc="http://schemas.openxmlformats.org/markup-compatibility/2006">
               <mc:Choice xmlns:v="urn:schemas-microsoft-com:vml" Requires="v">
-                <p:oleObj spid="_x0000_s13371" name="Equation" r:id="rId3" imgW="2336800" imgH="1320800" progId="Equation.3">
+                <p:oleObj spid="_x0000_s13381" name="Equation" r:id="rId3" imgW="2336800" imgH="1320800" progId="Equation.3">
                   <p:embed/>
                 </p:oleObj>
               </mc:Choice>
@@ -6399,14 +6399,14 @@
                       <a:effectLst/>
                       <a:extLst>
                         <a:ext uri="{909E8E84-426E-40dd-AFC4-6F175D3DCCD1}">
-                          <a14:hiddenFill xmlns:a14="http://schemas.microsoft.com/office/drawing/2010/main" xmlns="">
+                          <a14:hiddenFill xmlns="" xmlns:a14="http://schemas.microsoft.com/office/drawing/2010/main">
                             <a:solidFill>
                               <a:srgbClr val="FFFFFF"/>
                             </a:solidFill>
                           </a14:hiddenFill>
                         </a:ext>
                         <a:ext uri="{91240B29-F687-4f45-9708-019B960494DF}">
-                          <a14:hiddenLine xmlns:a14="http://schemas.microsoft.com/office/drawing/2010/main" xmlns="" w="9525">
+                          <a14:hiddenLine xmlns="" xmlns:a14="http://schemas.microsoft.com/office/drawing/2010/main" w="9525">
                             <a:solidFill>
                               <a:srgbClr val="000000"/>
                             </a:solidFill>
@@ -6416,7 +6416,7 @@
                           </a14:hiddenLine>
                         </a:ext>
                         <a:ext uri="{AF507438-7753-43e0-B8FC-AC1667EBCBE1}">
-                          <a14:hiddenEffects xmlns:a14="http://schemas.microsoft.com/office/drawing/2010/main" xmlns="">
+                          <a14:hiddenEffects xmlns="" xmlns:a14="http://schemas.microsoft.com/office/drawing/2010/main">
                             <a:effectLst>
                               <a:outerShdw dist="35921" dir="2700000" algn="ctr" rotWithShape="0">
                                 <a:srgbClr val="808080"/>
@@ -6449,7 +6449,7 @@
           <a:graphicData uri="http://schemas.openxmlformats.org/presentationml/2006/ole">
             <mc:AlternateContent xmlns:mc="http://schemas.openxmlformats.org/markup-compatibility/2006">
               <mc:Choice xmlns:v="urn:schemas-microsoft-com:vml" Requires="v">
-                <p:oleObj spid="_x0000_s13372" name="Equation" r:id="rId5" imgW="1536700" imgH="711200" progId="Equation.3">
+                <p:oleObj spid="_x0000_s13382" name="Equation" r:id="rId5" imgW="1536700" imgH="711200" progId="Equation.3">
                   <p:embed/>
                 </p:oleObj>
               </mc:Choice>
@@ -6492,14 +6492,14 @@
                       <a:effectLst/>
                       <a:extLst>
                         <a:ext uri="{909E8E84-426E-40dd-AFC4-6F175D3DCCD1}">
-                          <a14:hiddenFill xmlns:a14="http://schemas.microsoft.com/office/drawing/2010/main" xmlns="">
+                          <a14:hiddenFill xmlns="" xmlns:a14="http://schemas.microsoft.com/office/drawing/2010/main">
                             <a:solidFill>
                               <a:srgbClr val="FFFFFF"/>
                             </a:solidFill>
                           </a14:hiddenFill>
                         </a:ext>
                         <a:ext uri="{91240B29-F687-4f45-9708-019B960494DF}">
-                          <a14:hiddenLine xmlns:a14="http://schemas.microsoft.com/office/drawing/2010/main" xmlns="" w="9525">
+                          <a14:hiddenLine xmlns="" xmlns:a14="http://schemas.microsoft.com/office/drawing/2010/main" w="9525">
                             <a:solidFill>
                               <a:srgbClr val="000000"/>
                             </a:solidFill>
@@ -6509,7 +6509,7 @@
                           </a14:hiddenLine>
                         </a:ext>
                         <a:ext uri="{AF507438-7753-43e0-B8FC-AC1667EBCBE1}">
-                          <a14:hiddenEffects xmlns:a14="http://schemas.microsoft.com/office/drawing/2010/main" xmlns="">
+                          <a14:hiddenEffects xmlns="" xmlns:a14="http://schemas.microsoft.com/office/drawing/2010/main">
                             <a:effectLst>
                               <a:outerShdw dist="35921" dir="2700000" algn="ctr" rotWithShape="0">
                                 <a:srgbClr val="808080"/>
@@ -6542,7 +6542,7 @@
           <a:graphicData uri="http://schemas.openxmlformats.org/presentationml/2006/ole">
             <mc:AlternateContent xmlns:mc="http://schemas.openxmlformats.org/markup-compatibility/2006">
               <mc:Choice xmlns:v="urn:schemas-microsoft-com:vml" Requires="v">
-                <p:oleObj spid="_x0000_s13373" name="Equation" r:id="rId7" imgW="1206500" imgH="647700" progId="Equation.3">
+                <p:oleObj spid="_x0000_s13383" name="Equation" r:id="rId7" imgW="1206500" imgH="647700" progId="Equation.3">
                   <p:embed/>
                 </p:oleObj>
               </mc:Choice>
@@ -6585,14 +6585,14 @@
                       <a:effectLst/>
                       <a:extLst>
                         <a:ext uri="{909E8E84-426E-40dd-AFC4-6F175D3DCCD1}">
-                          <a14:hiddenFill xmlns:a14="http://schemas.microsoft.com/office/drawing/2010/main" xmlns="">
+                          <a14:hiddenFill xmlns="" xmlns:a14="http://schemas.microsoft.com/office/drawing/2010/main">
                             <a:solidFill>
                               <a:srgbClr val="FFFFFF"/>
                             </a:solidFill>
                           </a14:hiddenFill>
                         </a:ext>
                         <a:ext uri="{91240B29-F687-4f45-9708-019B960494DF}">
-                          <a14:hiddenLine xmlns:a14="http://schemas.microsoft.com/office/drawing/2010/main" xmlns="" w="9525">
+                          <a14:hiddenLine xmlns="" xmlns:a14="http://schemas.microsoft.com/office/drawing/2010/main" w="9525">
                             <a:solidFill>
                               <a:srgbClr val="000000"/>
                             </a:solidFill>
@@ -6602,7 +6602,7 @@
                           </a14:hiddenLine>
                         </a:ext>
                         <a:ext uri="{AF507438-7753-43e0-B8FC-AC1667EBCBE1}">
-                          <a14:hiddenEffects xmlns:a14="http://schemas.microsoft.com/office/drawing/2010/main" xmlns="">
+                          <a14:hiddenEffects xmlns="" xmlns:a14="http://schemas.microsoft.com/office/drawing/2010/main">
                             <a:effectLst>
                               <a:outerShdw dist="35921" dir="2700000" algn="ctr" rotWithShape="0">
                                 <a:srgbClr val="808080"/>
@@ -6642,14 +6642,14 @@
           <a:effectLst/>
           <a:extLst>
             <a:ext uri="{909E8E84-426E-40dd-AFC4-6F175D3DCCD1}">
-              <a14:hiddenFill xmlns:a14="http://schemas.microsoft.com/office/drawing/2010/main" xmlns="">
+              <a14:hiddenFill xmlns="" xmlns:a14="http://schemas.microsoft.com/office/drawing/2010/main">
                 <a:solidFill>
                   <a:schemeClr val="accent1"/>
                 </a:solidFill>
               </a14:hiddenFill>
             </a:ext>
             <a:ext uri="{91240B29-F687-4f45-9708-019B960494DF}">
-              <a14:hiddenLine xmlns:a14="http://schemas.microsoft.com/office/drawing/2010/main" xmlns="" w="9525">
+              <a14:hiddenLine xmlns="" xmlns:a14="http://schemas.microsoft.com/office/drawing/2010/main" w="9525">
                 <a:solidFill>
                   <a:schemeClr val="tx1"/>
                 </a:solidFill>
@@ -6659,7 +6659,7 @@
               </a14:hiddenLine>
             </a:ext>
             <a:ext uri="{AF507438-7753-43e0-B8FC-AC1667EBCBE1}">
-              <a14:hiddenEffects xmlns:a14="http://schemas.microsoft.com/office/drawing/2010/main" xmlns="">
+              <a14:hiddenEffects xmlns="" xmlns:a14="http://schemas.microsoft.com/office/drawing/2010/main">
                 <a:effectLst>
                   <a:outerShdw dist="35921" dir="2700000" algn="ctr" rotWithShape="0">
                     <a:schemeClr val="bg2"/>
@@ -7128,14 +7128,14 @@
           <a:effectLst/>
           <a:extLst>
             <a:ext uri="{909E8E84-426E-40dd-AFC4-6F175D3DCCD1}">
-              <a14:hiddenFill xmlns:a14="http://schemas.microsoft.com/office/drawing/2010/main" xmlns="">
+              <a14:hiddenFill xmlns="" xmlns:a14="http://schemas.microsoft.com/office/drawing/2010/main">
                 <a:solidFill>
                   <a:schemeClr val="accent1"/>
                 </a:solidFill>
               </a14:hiddenFill>
             </a:ext>
             <a:ext uri="{91240B29-F687-4f45-9708-019B960494DF}">
-              <a14:hiddenLine xmlns:a14="http://schemas.microsoft.com/office/drawing/2010/main" xmlns="" w="9525">
+              <a14:hiddenLine xmlns="" xmlns:a14="http://schemas.microsoft.com/office/drawing/2010/main" w="9525">
                 <a:solidFill>
                   <a:schemeClr val="tx1"/>
                 </a:solidFill>
@@ -7145,7 +7145,7 @@
               </a14:hiddenLine>
             </a:ext>
             <a:ext uri="{AF507438-7753-43e0-B8FC-AC1667EBCBE1}">
-              <a14:hiddenEffects xmlns:a14="http://schemas.microsoft.com/office/drawing/2010/main" xmlns="">
+              <a14:hiddenEffects xmlns="" xmlns:a14="http://schemas.microsoft.com/office/drawing/2010/main">
                 <a:effectLst>
                   <a:outerShdw dist="35921" dir="2700000" algn="ctr" rotWithShape="0">
                     <a:schemeClr val="bg2"/>
@@ -7577,14 +7577,14 @@
           <a:effectLst/>
           <a:extLst>
             <a:ext uri="{909E8E84-426E-40dd-AFC4-6F175D3DCCD1}">
-              <a14:hiddenFill xmlns:a14="http://schemas.microsoft.com/office/drawing/2010/main" xmlns="">
+              <a14:hiddenFill xmlns="" xmlns:a14="http://schemas.microsoft.com/office/drawing/2010/main">
                 <a:solidFill>
                   <a:schemeClr val="accent1"/>
                 </a:solidFill>
               </a14:hiddenFill>
             </a:ext>
             <a:ext uri="{91240B29-F687-4f45-9708-019B960494DF}">
-              <a14:hiddenLine xmlns:a14="http://schemas.microsoft.com/office/drawing/2010/main" xmlns="" w="9525">
+              <a14:hiddenLine xmlns="" xmlns:a14="http://schemas.microsoft.com/office/drawing/2010/main" w="9525">
                 <a:solidFill>
                   <a:schemeClr val="tx1"/>
                 </a:solidFill>
@@ -7594,7 +7594,7 @@
               </a14:hiddenLine>
             </a:ext>
             <a:ext uri="{AF507438-7753-43e0-B8FC-AC1667EBCBE1}">
-              <a14:hiddenEffects xmlns:a14="http://schemas.microsoft.com/office/drawing/2010/main" xmlns="">
+              <a14:hiddenEffects xmlns="" xmlns:a14="http://schemas.microsoft.com/office/drawing/2010/main">
                 <a:effectLst>
                   <a:outerShdw dist="35921" dir="2700000" algn="ctr" rotWithShape="0">
                     <a:schemeClr val="bg2"/>
@@ -7747,12 +7747,12 @@
           <a:effectLst/>
           <a:extLst>
             <a:ext uri="{909E8E84-426E-40dd-AFC4-6F175D3DCCD1}">
-              <a14:hiddenFill xmlns:a14="http://schemas.microsoft.com/office/drawing/2010/main" xmlns="">
+              <a14:hiddenFill xmlns="" xmlns:a14="http://schemas.microsoft.com/office/drawing/2010/main">
                 <a:noFill/>
               </a14:hiddenFill>
             </a:ext>
             <a:ext uri="{AF507438-7753-43e0-B8FC-AC1667EBCBE1}">
-              <a14:hiddenEffects xmlns:a14="http://schemas.microsoft.com/office/drawing/2010/main" xmlns="">
+              <a14:hiddenEffects xmlns="" xmlns:a14="http://schemas.microsoft.com/office/drawing/2010/main">
                 <a:effectLst>
                   <a:outerShdw dist="35921" dir="2700000" algn="ctr" rotWithShape="0">
                     <a:schemeClr val="bg2"/>
@@ -7793,14 +7793,14 @@
           <a:effectLst/>
           <a:extLst>
             <a:ext uri="{909E8E84-426E-40dd-AFC4-6F175D3DCCD1}">
-              <a14:hiddenFill xmlns:a14="http://schemas.microsoft.com/office/drawing/2010/main" xmlns="">
+              <a14:hiddenFill xmlns="" xmlns:a14="http://schemas.microsoft.com/office/drawing/2010/main">
                 <a:solidFill>
                   <a:schemeClr val="accent1"/>
                 </a:solidFill>
               </a14:hiddenFill>
             </a:ext>
             <a:ext uri="{91240B29-F687-4f45-9708-019B960494DF}">
-              <a14:hiddenLine xmlns:a14="http://schemas.microsoft.com/office/drawing/2010/main" xmlns="" w="9525">
+              <a14:hiddenLine xmlns="" xmlns:a14="http://schemas.microsoft.com/office/drawing/2010/main" w="9525">
                 <a:solidFill>
                   <a:schemeClr val="tx1"/>
                 </a:solidFill>
@@ -7810,7 +7810,7 @@
               </a14:hiddenLine>
             </a:ext>
             <a:ext uri="{AF507438-7753-43e0-B8FC-AC1667EBCBE1}">
-              <a14:hiddenEffects xmlns:a14="http://schemas.microsoft.com/office/drawing/2010/main" xmlns="">
+              <a14:hiddenEffects xmlns="" xmlns:a14="http://schemas.microsoft.com/office/drawing/2010/main">
                 <a:effectLst>
                   <a:outerShdw dist="35921" dir="2700000" algn="ctr" rotWithShape="0">
                     <a:schemeClr val="bg2"/>
@@ -8450,14 +8450,14 @@
           <a:effectLst/>
           <a:extLst>
             <a:ext uri="{909E8E84-426E-40dd-AFC4-6F175D3DCCD1}">
-              <a14:hiddenFill xmlns:a14="http://schemas.microsoft.com/office/drawing/2010/main" xmlns="">
+              <a14:hiddenFill xmlns="" xmlns:a14="http://schemas.microsoft.com/office/drawing/2010/main">
                 <a:solidFill>
                   <a:schemeClr val="accent1"/>
                 </a:solidFill>
               </a14:hiddenFill>
             </a:ext>
             <a:ext uri="{91240B29-F687-4f45-9708-019B960494DF}">
-              <a14:hiddenLine xmlns:a14="http://schemas.microsoft.com/office/drawing/2010/main" xmlns="" w="9525">
+              <a14:hiddenLine xmlns="" xmlns:a14="http://schemas.microsoft.com/office/drawing/2010/main" w="9525">
                 <a:solidFill>
                   <a:schemeClr val="tx1"/>
                 </a:solidFill>
@@ -8467,7 +8467,7 @@
               </a14:hiddenLine>
             </a:ext>
             <a:ext uri="{AF507438-7753-43e0-B8FC-AC1667EBCBE1}">
-              <a14:hiddenEffects xmlns:a14="http://schemas.microsoft.com/office/drawing/2010/main" xmlns="">
+              <a14:hiddenEffects xmlns="" xmlns:a14="http://schemas.microsoft.com/office/drawing/2010/main">
                 <a:effectLst>
                   <a:outerShdw dist="35921" dir="2700000" algn="ctr" rotWithShape="0">
                     <a:schemeClr val="bg2"/>
@@ -8620,12 +8620,12 @@
           <a:effectLst/>
           <a:extLst>
             <a:ext uri="{909E8E84-426E-40dd-AFC4-6F175D3DCCD1}">
-              <a14:hiddenFill xmlns:a14="http://schemas.microsoft.com/office/drawing/2010/main" xmlns="">
+              <a14:hiddenFill xmlns="" xmlns:a14="http://schemas.microsoft.com/office/drawing/2010/main">
                 <a:noFill/>
               </a14:hiddenFill>
             </a:ext>
             <a:ext uri="{AF507438-7753-43e0-B8FC-AC1667EBCBE1}">
-              <a14:hiddenEffects xmlns:a14="http://schemas.microsoft.com/office/drawing/2010/main" xmlns="">
+              <a14:hiddenEffects xmlns="" xmlns:a14="http://schemas.microsoft.com/office/drawing/2010/main">
                 <a:effectLst>
                   <a:outerShdw dist="35921" dir="2700000" algn="ctr" rotWithShape="0">
                     <a:schemeClr val="bg2"/>
@@ -8666,14 +8666,14 @@
           <a:effectLst/>
           <a:extLst>
             <a:ext uri="{909E8E84-426E-40dd-AFC4-6F175D3DCCD1}">
-              <a14:hiddenFill xmlns:a14="http://schemas.microsoft.com/office/drawing/2010/main" xmlns="">
+              <a14:hiddenFill xmlns="" xmlns:a14="http://schemas.microsoft.com/office/drawing/2010/main">
                 <a:solidFill>
                   <a:schemeClr val="accent1"/>
                 </a:solidFill>
               </a14:hiddenFill>
             </a:ext>
             <a:ext uri="{91240B29-F687-4f45-9708-019B960494DF}">
-              <a14:hiddenLine xmlns:a14="http://schemas.microsoft.com/office/drawing/2010/main" xmlns="" w="9525">
+              <a14:hiddenLine xmlns="" xmlns:a14="http://schemas.microsoft.com/office/drawing/2010/main" w="9525">
                 <a:solidFill>
                   <a:schemeClr val="tx1"/>
                 </a:solidFill>
@@ -8683,7 +8683,7 @@
               </a14:hiddenLine>
             </a:ext>
             <a:ext uri="{AF507438-7753-43e0-B8FC-AC1667EBCBE1}">
-              <a14:hiddenEffects xmlns:a14="http://schemas.microsoft.com/office/drawing/2010/main" xmlns="">
+              <a14:hiddenEffects xmlns="" xmlns:a14="http://schemas.microsoft.com/office/drawing/2010/main">
                 <a:effectLst>
                   <a:outerShdw dist="35921" dir="2700000" algn="ctr" rotWithShape="0">
                     <a:schemeClr val="bg2"/>
@@ -8943,7 +8943,7 @@
           <a:graphicData uri="http://schemas.openxmlformats.org/presentationml/2006/ole">
             <mc:AlternateContent xmlns:mc="http://schemas.openxmlformats.org/markup-compatibility/2006">
               <mc:Choice xmlns:v="urn:schemas-microsoft-com:vml" Requires="v">
-                <p:oleObj spid="_x0000_s16427" name="Equation" r:id="rId3" imgW="253890" imgH="279279" progId="Equation.3">
+                <p:oleObj spid="_x0000_s16434" name="Equation" r:id="rId3" imgW="253890" imgH="279279" progId="Equation.3">
                   <p:embed/>
                 </p:oleObj>
               </mc:Choice>
@@ -8986,14 +8986,14 @@
                       <a:effectLst/>
                       <a:extLst>
                         <a:ext uri="{909E8E84-426E-40dd-AFC4-6F175D3DCCD1}">
-                          <a14:hiddenFill xmlns:a14="http://schemas.microsoft.com/office/drawing/2010/main" xmlns="">
+                          <a14:hiddenFill xmlns="" xmlns:a14="http://schemas.microsoft.com/office/drawing/2010/main">
                             <a:solidFill>
                               <a:srgbClr val="FFFFFF"/>
                             </a:solidFill>
                           </a14:hiddenFill>
                         </a:ext>
                         <a:ext uri="{91240B29-F687-4f45-9708-019B960494DF}">
-                          <a14:hiddenLine xmlns:a14="http://schemas.microsoft.com/office/drawing/2010/main" xmlns="" w="9525">
+                          <a14:hiddenLine xmlns="" xmlns:a14="http://schemas.microsoft.com/office/drawing/2010/main" w="9525">
                             <a:solidFill>
                               <a:srgbClr val="000000"/>
                             </a:solidFill>
@@ -9003,7 +9003,7 @@
                           </a14:hiddenLine>
                         </a:ext>
                         <a:ext uri="{AF507438-7753-43e0-B8FC-AC1667EBCBE1}">
-                          <a14:hiddenEffects xmlns:a14="http://schemas.microsoft.com/office/drawing/2010/main" xmlns="">
+                          <a14:hiddenEffects xmlns="" xmlns:a14="http://schemas.microsoft.com/office/drawing/2010/main">
                             <a:effectLst>
                               <a:outerShdw dist="35921" dir="2700000" algn="ctr" rotWithShape="0">
                                 <a:srgbClr val="808080"/>
@@ -9036,7 +9036,7 @@
           <a:graphicData uri="http://schemas.openxmlformats.org/presentationml/2006/ole">
             <mc:AlternateContent xmlns:mc="http://schemas.openxmlformats.org/markup-compatibility/2006">
               <mc:Choice xmlns:v="urn:schemas-microsoft-com:vml" Requires="v">
-                <p:oleObj spid="_x0000_s16428" name="Equation" r:id="rId5" imgW="253890" imgH="279279" progId="Equation.3">
+                <p:oleObj spid="_x0000_s16435" name="Equation" r:id="rId5" imgW="253890" imgH="279279" progId="Equation.3">
                   <p:embed/>
                 </p:oleObj>
               </mc:Choice>
@@ -9079,14 +9079,14 @@
                       <a:effectLst/>
                       <a:extLst>
                         <a:ext uri="{909E8E84-426E-40dd-AFC4-6F175D3DCCD1}">
-                          <a14:hiddenFill xmlns:a14="http://schemas.microsoft.com/office/drawing/2010/main" xmlns="">
+                          <a14:hiddenFill xmlns="" xmlns:a14="http://schemas.microsoft.com/office/drawing/2010/main">
                             <a:solidFill>
                               <a:srgbClr val="FFFFFF"/>
                             </a:solidFill>
                           </a14:hiddenFill>
                         </a:ext>
                         <a:ext uri="{91240B29-F687-4f45-9708-019B960494DF}">
-                          <a14:hiddenLine xmlns:a14="http://schemas.microsoft.com/office/drawing/2010/main" xmlns="" w="9525">
+                          <a14:hiddenLine xmlns="" xmlns:a14="http://schemas.microsoft.com/office/drawing/2010/main" w="9525">
                             <a:solidFill>
                               <a:srgbClr val="000000"/>
                             </a:solidFill>
@@ -9096,7 +9096,7 @@
                           </a14:hiddenLine>
                         </a:ext>
                         <a:ext uri="{AF507438-7753-43e0-B8FC-AC1667EBCBE1}">
-                          <a14:hiddenEffects xmlns:a14="http://schemas.microsoft.com/office/drawing/2010/main" xmlns="">
+                          <a14:hiddenEffects xmlns="" xmlns:a14="http://schemas.microsoft.com/office/drawing/2010/main">
                             <a:effectLst>
                               <a:outerShdw dist="35921" dir="2700000" algn="ctr" rotWithShape="0">
                                 <a:srgbClr val="808080"/>
@@ -9149,14 +9149,14 @@
           <a:effectLst/>
           <a:extLst>
             <a:ext uri="{909E8E84-426E-40dd-AFC4-6F175D3DCCD1}">
-              <a14:hiddenFill xmlns:a14="http://schemas.microsoft.com/office/drawing/2010/main" xmlns="">
+              <a14:hiddenFill xmlns="" xmlns:a14="http://schemas.microsoft.com/office/drawing/2010/main">
                 <a:solidFill>
                   <a:schemeClr val="accent1"/>
                 </a:solidFill>
               </a14:hiddenFill>
             </a:ext>
             <a:ext uri="{91240B29-F687-4f45-9708-019B960494DF}">
-              <a14:hiddenLine xmlns:a14="http://schemas.microsoft.com/office/drawing/2010/main" xmlns="" w="9525">
+              <a14:hiddenLine xmlns="" xmlns:a14="http://schemas.microsoft.com/office/drawing/2010/main" w="9525">
                 <a:solidFill>
                   <a:schemeClr val="tx1"/>
                 </a:solidFill>
@@ -9166,7 +9166,7 @@
               </a14:hiddenLine>
             </a:ext>
             <a:ext uri="{AF507438-7753-43e0-B8FC-AC1667EBCBE1}">
-              <a14:hiddenEffects xmlns:a14="http://schemas.microsoft.com/office/drawing/2010/main" xmlns="">
+              <a14:hiddenEffects xmlns="" xmlns:a14="http://schemas.microsoft.com/office/drawing/2010/main">
                 <a:effectLst>
                   <a:outerShdw dist="35921" dir="2700000" algn="ctr" rotWithShape="0">
                     <a:schemeClr val="bg2"/>
@@ -9598,14 +9598,14 @@
           <a:effectLst/>
           <a:extLst>
             <a:ext uri="{909E8E84-426E-40dd-AFC4-6F175D3DCCD1}">
-              <a14:hiddenFill xmlns:a14="http://schemas.microsoft.com/office/drawing/2010/main" xmlns="">
+              <a14:hiddenFill xmlns="" xmlns:a14="http://schemas.microsoft.com/office/drawing/2010/main">
                 <a:solidFill>
                   <a:schemeClr val="accent1"/>
                 </a:solidFill>
               </a14:hiddenFill>
             </a:ext>
             <a:ext uri="{91240B29-F687-4f45-9708-019B960494DF}">
-              <a14:hiddenLine xmlns:a14="http://schemas.microsoft.com/office/drawing/2010/main" xmlns="" w="9525">
+              <a14:hiddenLine xmlns="" xmlns:a14="http://schemas.microsoft.com/office/drawing/2010/main" w="9525">
                 <a:solidFill>
                   <a:schemeClr val="tx1"/>
                 </a:solidFill>
@@ -9615,7 +9615,7 @@
               </a14:hiddenLine>
             </a:ext>
             <a:ext uri="{AF507438-7753-43e0-B8FC-AC1667EBCBE1}">
-              <a14:hiddenEffects xmlns:a14="http://schemas.microsoft.com/office/drawing/2010/main" xmlns="">
+              <a14:hiddenEffects xmlns="" xmlns:a14="http://schemas.microsoft.com/office/drawing/2010/main">
                 <a:effectLst>
                   <a:outerShdw dist="35921" dir="2700000" algn="ctr" rotWithShape="0">
                     <a:schemeClr val="bg2"/>
@@ -9761,10 +9761,10 @@
               </a:spcBef>
             </a:pPr>
             <a:r>
-              <a:rPr lang="en-US" b="1"/>
+              <a:rPr lang="en-US" b="1" dirty="0"/>
               <a:t>Determination of Statistical Significance for Results from Hypothesis Tests</a:t>
             </a:r>
-            <a:endParaRPr lang="en-US"/>
+            <a:endParaRPr lang="en-US" dirty="0"/>
           </a:p>
           <a:p>
             <a:pPr algn="just">
@@ -9773,7 +9773,7 @@
               </a:spcBef>
             </a:pPr>
             <a:r>
-              <a:rPr lang="en-US"/>
+              <a:rPr lang="en-US" dirty="0"/>
               <a:t>Either of the following methods can be used to establish whether results from hypothesis tests are statistically significant:</a:t>
             </a:r>
           </a:p>
@@ -9784,137 +9784,141 @@
               </a:spcBef>
             </a:pPr>
             <a:r>
-              <a:rPr lang="en-US"/>
-              <a:t>(1)	The test statistic Z can be computed and 	compared with the critical value       at an </a:t>
-            </a:r>
-            <a:r>
-              <a:rPr lang="en-US">
+              <a:rPr lang="en-US" dirty="0"/>
+              <a:t>(1)	</a:t>
+            </a:r>
+            <a:r>
+              <a:rPr lang="en-US" strike="sngStrike" dirty="0"/>
+              <a:t>The test statistic Z can be computed and 	compared with the critical value       at an </a:t>
+            </a:r>
+            <a:r>
+              <a:rPr lang="en-US" strike="sngStrike" dirty="0">
                 <a:sym typeface="Symbol" pitchFamily="18" charset="2"/>
               </a:rPr>
               <a:t> 	</a:t>
             </a:r>
             <a:r>
-              <a:rPr lang="en-US"/>
+              <a:rPr lang="en-US" strike="sngStrike" dirty="0"/>
               <a:t>level of .05.  Specifically, if H</a:t>
             </a:r>
             <a:r>
-              <a:rPr lang="en-US" baseline="-25000"/>
+              <a:rPr lang="en-US" strike="sngStrike" baseline="-25000" dirty="0"/>
               <a:t>0</a:t>
             </a:r>
             <a:r>
-              <a:rPr lang="en-US"/>
+              <a:rPr lang="en-US" strike="sngStrike" dirty="0"/>
               <a:t>: </a:t>
             </a:r>
             <a:r>
-              <a:rPr lang="en-US">
+              <a:rPr lang="en-US" strike="sngStrike" dirty="0">
                 <a:sym typeface="Symbol" pitchFamily="18" charset="2"/>
               </a:rPr>
               <a:t> = </a:t>
             </a:r>
             <a:r>
-              <a:rPr lang="en-US" baseline="-25000"/>
+              <a:rPr lang="en-US" strike="sngStrike" baseline="-25000" dirty="0"/>
               <a:t>0</a:t>
             </a:r>
             <a:r>
-              <a:rPr lang="en-US">
+              <a:rPr lang="en-US" strike="sngStrike" dirty="0">
                 <a:sym typeface="Symbol" pitchFamily="18" charset="2"/>
               </a:rPr>
               <a:t> versus 	H</a:t>
             </a:r>
             <a:r>
-              <a:rPr lang="en-US" baseline="-25000">
+              <a:rPr lang="en-US" strike="sngStrike" baseline="-25000" dirty="0">
                 <a:sym typeface="Symbol" pitchFamily="18" charset="2"/>
               </a:rPr>
               <a:t>1</a:t>
             </a:r>
             <a:r>
-              <a:rPr lang="en-US">
+              <a:rPr lang="en-US" strike="sngStrike" dirty="0">
                 <a:sym typeface="Symbol" pitchFamily="18" charset="2"/>
               </a:rPr>
               <a:t>:   </a:t>
             </a:r>
             <a:r>
-              <a:rPr lang="en-US" baseline="-25000"/>
+              <a:rPr lang="en-US" strike="sngStrike" baseline="-25000" dirty="0"/>
               <a:t>0</a:t>
             </a:r>
             <a:r>
-              <a:rPr lang="en-US">
+              <a:rPr lang="en-US" strike="sngStrike" dirty="0">
                 <a:sym typeface="Symbol" pitchFamily="18" charset="2"/>
               </a:rPr>
               <a:t> are being tested and |Z| &gt; 1.96, 	then </a:t>
             </a:r>
             <a:r>
-              <a:rPr lang="en-US"/>
+              <a:rPr lang="en-US" strike="sngStrike" dirty="0"/>
               <a:t>H</a:t>
             </a:r>
             <a:r>
-              <a:rPr lang="en-US" baseline="-25000"/>
+              <a:rPr lang="en-US" strike="sngStrike" baseline="-25000" dirty="0"/>
               <a:t>0</a:t>
             </a:r>
             <a:r>
-              <a:rPr lang="en-US">
+              <a:rPr lang="en-US" strike="sngStrike" dirty="0">
                 <a:sym typeface="Symbol" pitchFamily="18" charset="2"/>
               </a:rPr>
               <a:t> is rejected and the results are declared 	</a:t>
             </a:r>
             <a:r>
-              <a:rPr lang="en-US" i="1">
+              <a:rPr lang="en-US" i="1" strike="sngStrike" dirty="0">
                 <a:sym typeface="Symbol" pitchFamily="18" charset="2"/>
               </a:rPr>
               <a:t>statistically significant</a:t>
             </a:r>
             <a:r>
-              <a:rPr lang="en-US">
+              <a:rPr lang="en-US" strike="sngStrike" dirty="0">
                 <a:sym typeface="Symbol" pitchFamily="18" charset="2"/>
               </a:rPr>
               <a:t> (i.e., p &lt; .05).  		Otherwise, </a:t>
             </a:r>
             <a:r>
-              <a:rPr lang="en-US"/>
+              <a:rPr lang="en-US" strike="sngStrike" dirty="0"/>
               <a:t>H</a:t>
             </a:r>
             <a:r>
-              <a:rPr lang="en-US" baseline="-25000"/>
+              <a:rPr lang="en-US" strike="sngStrike" baseline="-25000" dirty="0"/>
               <a:t>0</a:t>
             </a:r>
             <a:r>
-              <a:rPr lang="en-US">
+              <a:rPr lang="en-US" strike="sngStrike" dirty="0">
                 <a:sym typeface="Symbol" pitchFamily="18" charset="2"/>
               </a:rPr>
               <a:t> is accepted and the results are 	declared </a:t>
             </a:r>
             <a:r>
-              <a:rPr lang="en-US" i="1">
+              <a:rPr lang="en-US" i="1" strike="sngStrike" dirty="0">
                 <a:sym typeface="Symbol" pitchFamily="18" charset="2"/>
               </a:rPr>
               <a:t>not</a:t>
             </a:r>
             <a:r>
-              <a:rPr lang="en-US">
+              <a:rPr lang="en-US" strike="sngStrike" dirty="0">
                 <a:sym typeface="Symbol" pitchFamily="18" charset="2"/>
               </a:rPr>
               <a:t> </a:t>
             </a:r>
             <a:r>
-              <a:rPr lang="en-US" i="1">
+              <a:rPr lang="en-US" i="1" strike="sngStrike" dirty="0">
                 <a:sym typeface="Symbol" pitchFamily="18" charset="2"/>
               </a:rPr>
               <a:t>statistically significant</a:t>
             </a:r>
             <a:r>
-              <a:rPr lang="en-US">
+              <a:rPr lang="en-US" strike="sngStrike" dirty="0">
                 <a:sym typeface="Symbol" pitchFamily="18" charset="2"/>
               </a:rPr>
               <a:t> (i.e., p  	.05).  We refer to this approach as the 		</a:t>
             </a:r>
             <a:r>
-              <a:rPr lang="en-US" b="1">
+              <a:rPr lang="en-US" b="1" strike="sngStrike" dirty="0">
                 <a:sym typeface="Symbol" pitchFamily="18" charset="2"/>
               </a:rPr>
               <a:t>critical-value method</a:t>
             </a:r>
             <a:r>
-              <a:rPr lang="en-US">
+              <a:rPr lang="en-US" strike="sngStrike" dirty="0">
                 <a:sym typeface="Symbol" pitchFamily="18" charset="2"/>
               </a:rPr>
               <a:t>.</a:t>
@@ -9927,83 +9931,83 @@
               </a:spcBef>
             </a:pPr>
             <a:r>
-              <a:rPr lang="en-US">
+              <a:rPr lang="en-US" dirty="0">
                 <a:sym typeface="Symbol" pitchFamily="18" charset="2"/>
               </a:rPr>
               <a:t>(2)	The exact p-value can be computed, and if p &lt; 	.05, then </a:t>
             </a:r>
             <a:r>
-              <a:rPr lang="en-US"/>
+              <a:rPr lang="en-US" dirty="0"/>
               <a:t>H</a:t>
             </a:r>
             <a:r>
-              <a:rPr lang="en-US" baseline="-25000"/>
+              <a:rPr lang="en-US" baseline="-25000" dirty="0"/>
               <a:t>0</a:t>
             </a:r>
             <a:r>
-              <a:rPr lang="en-US">
+              <a:rPr lang="en-US" dirty="0">
                 <a:sym typeface="Symbol" pitchFamily="18" charset="2"/>
               </a:rPr>
               <a:t> is rejected and the results are 	declared </a:t>
             </a:r>
             <a:r>
-              <a:rPr lang="en-US" i="1">
+              <a:rPr lang="en-US" i="1" dirty="0">
                 <a:sym typeface="Symbol" pitchFamily="18" charset="2"/>
               </a:rPr>
               <a:t>statistically significant</a:t>
             </a:r>
             <a:r>
-              <a:rPr lang="en-US">
+              <a:rPr lang="en-US" dirty="0">
                 <a:sym typeface="Symbol" pitchFamily="18" charset="2"/>
               </a:rPr>
               <a:t> . Otherwise, if 	p  	.05 then </a:t>
             </a:r>
             <a:r>
-              <a:rPr lang="en-US"/>
+              <a:rPr lang="en-US" dirty="0"/>
               <a:t>H</a:t>
             </a:r>
             <a:r>
-              <a:rPr lang="en-US" baseline="-25000"/>
+              <a:rPr lang="en-US" baseline="-25000" dirty="0"/>
               <a:t>0</a:t>
             </a:r>
             <a:r>
-              <a:rPr lang="en-US">
+              <a:rPr lang="en-US" dirty="0">
                 <a:sym typeface="Symbol" pitchFamily="18" charset="2"/>
               </a:rPr>
               <a:t> is accepted and the results are 	declared </a:t>
             </a:r>
             <a:r>
-              <a:rPr lang="en-US" i="1">
+              <a:rPr lang="en-US" i="1" dirty="0">
                 <a:sym typeface="Symbol" pitchFamily="18" charset="2"/>
               </a:rPr>
               <a:t>not</a:t>
             </a:r>
             <a:r>
-              <a:rPr lang="en-US">
+              <a:rPr lang="en-US" dirty="0">
                 <a:sym typeface="Symbol" pitchFamily="18" charset="2"/>
               </a:rPr>
               <a:t> </a:t>
             </a:r>
             <a:r>
-              <a:rPr lang="en-US" i="1">
+              <a:rPr lang="en-US" i="1" dirty="0">
                 <a:sym typeface="Symbol" pitchFamily="18" charset="2"/>
               </a:rPr>
               <a:t>statistically significant</a:t>
             </a:r>
             <a:r>
-              <a:rPr lang="en-US">
+              <a:rPr lang="en-US" dirty="0">
                 <a:sym typeface="Symbol" pitchFamily="18" charset="2"/>
               </a:rPr>
               <a:t> .  We will 	refer to this approach as the </a:t>
             </a:r>
             <a:r>
-              <a:rPr lang="en-US" b="1">
+              <a:rPr lang="en-US" b="1" dirty="0">
                 <a:sym typeface="Symbol" pitchFamily="18" charset="2"/>
               </a:rPr>
               <a:t>p-value method</a:t>
             </a:r>
             <a:r>
-              <a:rPr lang="en-US">
+              <a:rPr lang="en-US" dirty="0">
                 <a:sym typeface="Symbol" pitchFamily="18" charset="2"/>
               </a:rPr>
               <a:t> .</a:t>
@@ -10027,7 +10031,7 @@
           <a:graphicData uri="http://schemas.openxmlformats.org/presentationml/2006/ole">
             <mc:AlternateContent xmlns:mc="http://schemas.openxmlformats.org/markup-compatibility/2006">
               <mc:Choice xmlns:v="urn:schemas-microsoft-com:vml" Requires="v">
-                <p:oleObj spid="_x0000_s17432" name="Equation" r:id="rId3" imgW="634449" imgH="317225" progId="Equation.3">
+                <p:oleObj spid="_x0000_s17436" name="Equation" r:id="rId3" imgW="634449" imgH="317225" progId="Equation.3">
                   <p:embed/>
                 </p:oleObj>
               </mc:Choice>
@@ -10070,14 +10074,14 @@
                       <a:effectLst/>
                       <a:extLst>
                         <a:ext uri="{909E8E84-426E-40dd-AFC4-6F175D3DCCD1}">
-                          <a14:hiddenFill xmlns:a14="http://schemas.microsoft.com/office/drawing/2010/main" xmlns="">
+                          <a14:hiddenFill xmlns="" xmlns:a14="http://schemas.microsoft.com/office/drawing/2010/main">
                             <a:solidFill>
                               <a:srgbClr val="FFFFFF"/>
                             </a:solidFill>
                           </a14:hiddenFill>
                         </a:ext>
                         <a:ext uri="{91240B29-F687-4f45-9708-019B960494DF}">
-                          <a14:hiddenLine xmlns:a14="http://schemas.microsoft.com/office/drawing/2010/main" xmlns="" w="9525">
+                          <a14:hiddenLine xmlns="" xmlns:a14="http://schemas.microsoft.com/office/drawing/2010/main" w="9525">
                             <a:solidFill>
                               <a:srgbClr val="000000"/>
                             </a:solidFill>
@@ -10087,7 +10091,7 @@
                           </a14:hiddenLine>
                         </a:ext>
                         <a:ext uri="{AF507438-7753-43e0-B8FC-AC1667EBCBE1}">
-                          <a14:hiddenEffects xmlns:a14="http://schemas.microsoft.com/office/drawing/2010/main" xmlns="">
+                          <a14:hiddenEffects xmlns="" xmlns:a14="http://schemas.microsoft.com/office/drawing/2010/main">
                             <a:effectLst>
                               <a:outerShdw dist="35921" dir="2700000" algn="ctr" rotWithShape="0">
                                 <a:srgbClr val="808080"/>
@@ -10525,14 +10529,14 @@
           <a:effectLst/>
           <a:extLst>
             <a:ext uri="{909E8E84-426E-40dd-AFC4-6F175D3DCCD1}">
-              <a14:hiddenFill xmlns:a14="http://schemas.microsoft.com/office/drawing/2010/main" xmlns="">
+              <a14:hiddenFill xmlns="" xmlns:a14="http://schemas.microsoft.com/office/drawing/2010/main">
                 <a:solidFill>
                   <a:schemeClr val="accent1"/>
                 </a:solidFill>
               </a14:hiddenFill>
             </a:ext>
             <a:ext uri="{91240B29-F687-4f45-9708-019B960494DF}">
-              <a14:hiddenLine xmlns:a14="http://schemas.microsoft.com/office/drawing/2010/main" xmlns="" w="9525">
+              <a14:hiddenLine xmlns="" xmlns:a14="http://schemas.microsoft.com/office/drawing/2010/main" w="9525">
                 <a:solidFill>
                   <a:schemeClr val="tx1"/>
                 </a:solidFill>
@@ -10542,7 +10546,7 @@
               </a14:hiddenLine>
             </a:ext>
             <a:ext uri="{AF507438-7753-43e0-B8FC-AC1667EBCBE1}">
-              <a14:hiddenEffects xmlns:a14="http://schemas.microsoft.com/office/drawing/2010/main" xmlns="">
+              <a14:hiddenEffects xmlns="" xmlns:a14="http://schemas.microsoft.com/office/drawing/2010/main">
                 <a:effectLst>
                   <a:outerShdw dist="35921" dir="2700000" algn="ctr" rotWithShape="0">
                     <a:schemeClr val="bg2"/>
@@ -11393,14 +11397,14 @@
           <a:effectLst/>
           <a:extLst>
             <a:ext uri="{909E8E84-426E-40dd-AFC4-6F175D3DCCD1}">
-              <a14:hiddenFill xmlns:a14="http://schemas.microsoft.com/office/drawing/2010/main" xmlns="">
+              <a14:hiddenFill xmlns="" xmlns:a14="http://schemas.microsoft.com/office/drawing/2010/main">
                 <a:solidFill>
                   <a:schemeClr val="accent1"/>
                 </a:solidFill>
               </a14:hiddenFill>
             </a:ext>
             <a:ext uri="{91240B29-F687-4f45-9708-019B960494DF}">
-              <a14:hiddenLine xmlns:a14="http://schemas.microsoft.com/office/drawing/2010/main" xmlns="" w="9525">
+              <a14:hiddenLine xmlns="" xmlns:a14="http://schemas.microsoft.com/office/drawing/2010/main" w="9525">
                 <a:solidFill>
                   <a:schemeClr val="tx1"/>
                 </a:solidFill>
@@ -11410,7 +11414,7 @@
               </a14:hiddenLine>
             </a:ext>
             <a:ext uri="{AF507438-7753-43e0-B8FC-AC1667EBCBE1}">
-              <a14:hiddenEffects xmlns:a14="http://schemas.microsoft.com/office/drawing/2010/main" xmlns="">
+              <a14:hiddenEffects xmlns="" xmlns:a14="http://schemas.microsoft.com/office/drawing/2010/main">
                 <a:effectLst>
                   <a:outerShdw dist="35921" dir="2700000" algn="ctr" rotWithShape="0">
                     <a:schemeClr val="bg2"/>
@@ -11559,12 +11563,12 @@
           <a:effectLst/>
           <a:extLst>
             <a:ext uri="{909E8E84-426E-40dd-AFC4-6F175D3DCCD1}">
-              <a14:hiddenFill xmlns:a14="http://schemas.microsoft.com/office/drawing/2010/main" xmlns="">
+              <a14:hiddenFill xmlns="" xmlns:a14="http://schemas.microsoft.com/office/drawing/2010/main">
                 <a:noFill/>
               </a14:hiddenFill>
             </a:ext>
             <a:ext uri="{AF507438-7753-43e0-B8FC-AC1667EBCBE1}">
-              <a14:hiddenEffects xmlns:a14="http://schemas.microsoft.com/office/drawing/2010/main" xmlns="">
+              <a14:hiddenEffects xmlns="" xmlns:a14="http://schemas.microsoft.com/office/drawing/2010/main">
                 <a:effectLst>
                   <a:outerShdw dist="35921" dir="2700000" algn="ctr" rotWithShape="0">
                     <a:schemeClr val="bg2"/>
@@ -11605,14 +11609,14 @@
           <a:effectLst/>
           <a:extLst>
             <a:ext uri="{909E8E84-426E-40dd-AFC4-6F175D3DCCD1}">
-              <a14:hiddenFill xmlns:a14="http://schemas.microsoft.com/office/drawing/2010/main" xmlns="">
+              <a14:hiddenFill xmlns="" xmlns:a14="http://schemas.microsoft.com/office/drawing/2010/main">
                 <a:solidFill>
                   <a:schemeClr val="accent1"/>
                 </a:solidFill>
               </a14:hiddenFill>
             </a:ext>
             <a:ext uri="{91240B29-F687-4f45-9708-019B960494DF}">
-              <a14:hiddenLine xmlns:a14="http://schemas.microsoft.com/office/drawing/2010/main" xmlns="" w="9525">
+              <a14:hiddenLine xmlns="" xmlns:a14="http://schemas.microsoft.com/office/drawing/2010/main" w="9525">
                 <a:solidFill>
                   <a:schemeClr val="tx1"/>
                 </a:solidFill>
@@ -11622,7 +11626,7 @@
               </a14:hiddenLine>
             </a:ext>
             <a:ext uri="{AF507438-7753-43e0-B8FC-AC1667EBCBE1}">
-              <a14:hiddenEffects xmlns:a14="http://schemas.microsoft.com/office/drawing/2010/main" xmlns="">
+              <a14:hiddenEffects xmlns="" xmlns:a14="http://schemas.microsoft.com/office/drawing/2010/main">
                 <a:effectLst>
                   <a:outerShdw dist="35921" dir="2700000" algn="ctr" rotWithShape="0">
                     <a:schemeClr val="bg2"/>
@@ -11918,7 +11922,7 @@
           <a:graphicData uri="http://schemas.openxmlformats.org/presentationml/2006/ole">
             <mc:AlternateContent xmlns:mc="http://schemas.openxmlformats.org/markup-compatibility/2006">
               <mc:Choice xmlns:v="urn:schemas-microsoft-com:vml" Requires="v">
-                <p:oleObj spid="_x0000_s19498" name="Equation" r:id="rId3" imgW="2578100" imgH="1422400" progId="Equation.3">
+                <p:oleObj spid="_x0000_s19505" name="Equation" r:id="rId3" imgW="2578100" imgH="1422400" progId="Equation.3">
                   <p:embed/>
                 </p:oleObj>
               </mc:Choice>
@@ -11961,14 +11965,14 @@
                       <a:effectLst/>
                       <a:extLst>
                         <a:ext uri="{909E8E84-426E-40dd-AFC4-6F175D3DCCD1}">
-                          <a14:hiddenFill xmlns:a14="http://schemas.microsoft.com/office/drawing/2010/main" xmlns="">
+                          <a14:hiddenFill xmlns="" xmlns:a14="http://schemas.microsoft.com/office/drawing/2010/main">
                             <a:solidFill>
                               <a:srgbClr val="FFFFFF"/>
                             </a:solidFill>
                           </a14:hiddenFill>
                         </a:ext>
                         <a:ext uri="{91240B29-F687-4f45-9708-019B960494DF}">
-                          <a14:hiddenLine xmlns:a14="http://schemas.microsoft.com/office/drawing/2010/main" xmlns="" w="9525">
+                          <a14:hiddenLine xmlns="" xmlns:a14="http://schemas.microsoft.com/office/drawing/2010/main" w="9525">
                             <a:solidFill>
                               <a:srgbClr val="000000"/>
                             </a:solidFill>
@@ -11978,7 +11982,7 @@
                           </a14:hiddenLine>
                         </a:ext>
                         <a:ext uri="{AF507438-7753-43e0-B8FC-AC1667EBCBE1}">
-                          <a14:hiddenEffects xmlns:a14="http://schemas.microsoft.com/office/drawing/2010/main" xmlns="">
+                          <a14:hiddenEffects xmlns="" xmlns:a14="http://schemas.microsoft.com/office/drawing/2010/main">
                             <a:effectLst>
                               <a:outerShdw dist="35921" dir="2700000" algn="ctr" rotWithShape="0">
                                 <a:srgbClr val="808080"/>
@@ -12011,7 +12015,7 @@
           <a:graphicData uri="http://schemas.openxmlformats.org/presentationml/2006/ole">
             <mc:AlternateContent xmlns:mc="http://schemas.openxmlformats.org/markup-compatibility/2006">
               <mc:Choice xmlns:v="urn:schemas-microsoft-com:vml" Requires="v">
-                <p:oleObj spid="_x0000_s19499" name="Equation" r:id="rId5" imgW="2413000" imgH="1422400" progId="Equation.3">
+                <p:oleObj spid="_x0000_s19506" name="Equation" r:id="rId5" imgW="2413000" imgH="1422400" progId="Equation.3">
                   <p:embed/>
                 </p:oleObj>
               </mc:Choice>
@@ -12054,14 +12058,14 @@
                       <a:effectLst/>
                       <a:extLst>
                         <a:ext uri="{909E8E84-426E-40dd-AFC4-6F175D3DCCD1}">
-                          <a14:hiddenFill xmlns:a14="http://schemas.microsoft.com/office/drawing/2010/main" xmlns="">
+                          <a14:hiddenFill xmlns="" xmlns:a14="http://schemas.microsoft.com/office/drawing/2010/main">
                             <a:solidFill>
                               <a:srgbClr val="FFFFFF"/>
                             </a:solidFill>
                           </a14:hiddenFill>
                         </a:ext>
                         <a:ext uri="{91240B29-F687-4f45-9708-019B960494DF}">
-                          <a14:hiddenLine xmlns:a14="http://schemas.microsoft.com/office/drawing/2010/main" xmlns="" w="9525">
+                          <a14:hiddenLine xmlns="" xmlns:a14="http://schemas.microsoft.com/office/drawing/2010/main" w="9525">
                             <a:solidFill>
                               <a:srgbClr val="000000"/>
                             </a:solidFill>
@@ -12071,7 +12075,7 @@
                           </a14:hiddenLine>
                         </a:ext>
                         <a:ext uri="{AF507438-7753-43e0-B8FC-AC1667EBCBE1}">
-                          <a14:hiddenEffects xmlns:a14="http://schemas.microsoft.com/office/drawing/2010/main" xmlns="">
+                          <a14:hiddenEffects xmlns="" xmlns:a14="http://schemas.microsoft.com/office/drawing/2010/main">
                             <a:effectLst>
                               <a:outerShdw dist="35921" dir="2700000" algn="ctr" rotWithShape="0">
                                 <a:srgbClr val="808080"/>
@@ -12509,14 +12513,14 @@
           <a:effectLst/>
           <a:extLst>
             <a:ext uri="{909E8E84-426E-40dd-AFC4-6F175D3DCCD1}">
-              <a14:hiddenFill xmlns:a14="http://schemas.microsoft.com/office/drawing/2010/main" xmlns="">
+              <a14:hiddenFill xmlns="" xmlns:a14="http://schemas.microsoft.com/office/drawing/2010/main">
                 <a:solidFill>
                   <a:schemeClr val="accent1"/>
                 </a:solidFill>
               </a14:hiddenFill>
             </a:ext>
             <a:ext uri="{91240B29-F687-4f45-9708-019B960494DF}">
-              <a14:hiddenLine xmlns:a14="http://schemas.microsoft.com/office/drawing/2010/main" xmlns="" w="9525">
+              <a14:hiddenLine xmlns="" xmlns:a14="http://schemas.microsoft.com/office/drawing/2010/main" w="9525">
                 <a:solidFill>
                   <a:schemeClr val="tx1"/>
                 </a:solidFill>
@@ -12526,7 +12530,7 @@
               </a14:hiddenLine>
             </a:ext>
             <a:ext uri="{AF507438-7753-43e0-B8FC-AC1667EBCBE1}">
-              <a14:hiddenEffects xmlns:a14="http://schemas.microsoft.com/office/drawing/2010/main" xmlns="">
+              <a14:hiddenEffects xmlns="" xmlns:a14="http://schemas.microsoft.com/office/drawing/2010/main">
                 <a:effectLst>
                   <a:outerShdw dist="35921" dir="2700000" algn="ctr" rotWithShape="0">
                     <a:schemeClr val="bg2"/>
@@ -12682,12 +12686,12 @@
           <a:effectLst/>
           <a:extLst>
             <a:ext uri="{909E8E84-426E-40dd-AFC4-6F175D3DCCD1}">
-              <a14:hiddenFill xmlns:a14="http://schemas.microsoft.com/office/drawing/2010/main" xmlns="">
+              <a14:hiddenFill xmlns="" xmlns:a14="http://schemas.microsoft.com/office/drawing/2010/main">
                 <a:noFill/>
               </a14:hiddenFill>
             </a:ext>
             <a:ext uri="{AF507438-7753-43e0-B8FC-AC1667EBCBE1}">
-              <a14:hiddenEffects xmlns:a14="http://schemas.microsoft.com/office/drawing/2010/main" xmlns="">
+              <a14:hiddenEffects xmlns="" xmlns:a14="http://schemas.microsoft.com/office/drawing/2010/main">
                 <a:effectLst>
                   <a:outerShdw dist="35921" dir="2700000" algn="ctr" rotWithShape="0">
                     <a:schemeClr val="bg2"/>
@@ -12728,14 +12732,14 @@
           <a:effectLst/>
           <a:extLst>
             <a:ext uri="{909E8E84-426E-40dd-AFC4-6F175D3DCCD1}">
-              <a14:hiddenFill xmlns:a14="http://schemas.microsoft.com/office/drawing/2010/main" xmlns="">
+              <a14:hiddenFill xmlns="" xmlns:a14="http://schemas.microsoft.com/office/drawing/2010/main">
                 <a:solidFill>
                   <a:schemeClr val="accent1"/>
                 </a:solidFill>
               </a14:hiddenFill>
             </a:ext>
             <a:ext uri="{91240B29-F687-4f45-9708-019B960494DF}">
-              <a14:hiddenLine xmlns:a14="http://schemas.microsoft.com/office/drawing/2010/main" xmlns="" w="9525">
+              <a14:hiddenLine xmlns="" xmlns:a14="http://schemas.microsoft.com/office/drawing/2010/main" w="9525">
                 <a:solidFill>
                   <a:schemeClr val="tx1"/>
                 </a:solidFill>
@@ -12745,7 +12749,7 @@
               </a14:hiddenLine>
             </a:ext>
             <a:ext uri="{AF507438-7753-43e0-B8FC-AC1667EBCBE1}">
-              <a14:hiddenEffects xmlns:a14="http://schemas.microsoft.com/office/drawing/2010/main" xmlns="">
+              <a14:hiddenEffects xmlns="" xmlns:a14="http://schemas.microsoft.com/office/drawing/2010/main">
                 <a:effectLst>
                   <a:outerShdw dist="35921" dir="2700000" algn="ctr" rotWithShape="0">
                     <a:schemeClr val="bg2"/>
@@ -13577,14 +13581,14 @@
           <a:effectLst/>
           <a:extLst>
             <a:ext uri="{909E8E84-426E-40dd-AFC4-6F175D3DCCD1}">
-              <a14:hiddenFill xmlns:a14="http://schemas.microsoft.com/office/drawing/2010/main" xmlns="">
+              <a14:hiddenFill xmlns="" xmlns:a14="http://schemas.microsoft.com/office/drawing/2010/main">
                 <a:solidFill>
                   <a:schemeClr val="accent1"/>
                 </a:solidFill>
               </a14:hiddenFill>
             </a:ext>
             <a:ext uri="{91240B29-F687-4f45-9708-019B960494DF}">
-              <a14:hiddenLine xmlns:a14="http://schemas.microsoft.com/office/drawing/2010/main" xmlns="" w="9525">
+              <a14:hiddenLine xmlns="" xmlns:a14="http://schemas.microsoft.com/office/drawing/2010/main" w="9525">
                 <a:solidFill>
                   <a:schemeClr val="tx1"/>
                 </a:solidFill>
@@ -13594,7 +13598,7 @@
               </a14:hiddenLine>
             </a:ext>
             <a:ext uri="{AF507438-7753-43e0-B8FC-AC1667EBCBE1}">
-              <a14:hiddenEffects xmlns:a14="http://schemas.microsoft.com/office/drawing/2010/main" xmlns="">
+              <a14:hiddenEffects xmlns="" xmlns:a14="http://schemas.microsoft.com/office/drawing/2010/main">
                 <a:effectLst>
                   <a:outerShdw dist="35921" dir="2700000" algn="ctr" rotWithShape="0">
                     <a:schemeClr val="bg2"/>
@@ -13754,12 +13758,12 @@
           <a:effectLst/>
           <a:extLst>
             <a:ext uri="{909E8E84-426E-40dd-AFC4-6F175D3DCCD1}">
-              <a14:hiddenFill xmlns:a14="http://schemas.microsoft.com/office/drawing/2010/main" xmlns="">
+              <a14:hiddenFill xmlns="" xmlns:a14="http://schemas.microsoft.com/office/drawing/2010/main">
                 <a:noFill/>
               </a14:hiddenFill>
             </a:ext>
             <a:ext uri="{AF507438-7753-43e0-B8FC-AC1667EBCBE1}">
-              <a14:hiddenEffects xmlns:a14="http://schemas.microsoft.com/office/drawing/2010/main" xmlns="">
+              <a14:hiddenEffects xmlns="" xmlns:a14="http://schemas.microsoft.com/office/drawing/2010/main">
                 <a:effectLst>
                   <a:outerShdw dist="35921" dir="2700000" algn="ctr" rotWithShape="0">
                     <a:schemeClr val="bg2"/>
@@ -13800,14 +13804,14 @@
           <a:effectLst/>
           <a:extLst>
             <a:ext uri="{909E8E84-426E-40dd-AFC4-6F175D3DCCD1}">
-              <a14:hiddenFill xmlns:a14="http://schemas.microsoft.com/office/drawing/2010/main" xmlns="">
+              <a14:hiddenFill xmlns="" xmlns:a14="http://schemas.microsoft.com/office/drawing/2010/main">
                 <a:solidFill>
                   <a:schemeClr val="accent1"/>
                 </a:solidFill>
               </a14:hiddenFill>
             </a:ext>
             <a:ext uri="{91240B29-F687-4f45-9708-019B960494DF}">
-              <a14:hiddenLine xmlns:a14="http://schemas.microsoft.com/office/drawing/2010/main" xmlns="" w="9525">
+              <a14:hiddenLine xmlns="" xmlns:a14="http://schemas.microsoft.com/office/drawing/2010/main" w="9525">
                 <a:solidFill>
                   <a:schemeClr val="tx1"/>
                 </a:solidFill>
@@ -13817,7 +13821,7 @@
               </a14:hiddenLine>
             </a:ext>
             <a:ext uri="{AF507438-7753-43e0-B8FC-AC1667EBCBE1}">
-              <a14:hiddenEffects xmlns:a14="http://schemas.microsoft.com/office/drawing/2010/main" xmlns="">
+              <a14:hiddenEffects xmlns="" xmlns:a14="http://schemas.microsoft.com/office/drawing/2010/main">
                 <a:effectLst>
                   <a:outerShdw dist="35921" dir="2700000" algn="ctr" rotWithShape="0">
                     <a:schemeClr val="bg2"/>
@@ -13936,11 +13940,11 @@
               </a:spcBef>
             </a:pPr>
             <a:r>
-              <a:rPr lang="en-US" b="1"/>
+              <a:rPr lang="en-US" b="1" dirty="0"/>
               <a:t>Cholesterol Example</a:t>
             </a:r>
             <a:r>
-              <a:rPr lang="en-US"/>
+              <a:rPr lang="en-US" dirty="0"/>
               <a:t>:  Instead of the two-sided alternative considered earlier we may have only been interested in the alternative that hypertensives had a higher serum cholesterol.</a:t>
             </a:r>
           </a:p>
@@ -13951,19 +13955,19 @@
               </a:spcBef>
             </a:pPr>
             <a:r>
-              <a:rPr lang="en-US"/>
+              <a:rPr lang="en-US" dirty="0"/>
               <a:t>H</a:t>
             </a:r>
             <a:r>
-              <a:rPr lang="en-US" baseline="-25000"/>
+              <a:rPr lang="en-US" baseline="-25000" dirty="0"/>
               <a:t>0</a:t>
             </a:r>
             <a:r>
-              <a:rPr lang="en-US"/>
+              <a:rPr lang="en-US" dirty="0"/>
               <a:t>  :  </a:t>
             </a:r>
             <a:r>
-              <a:rPr lang="en-US">
+              <a:rPr lang="en-US" dirty="0">
                 <a:sym typeface="Symbol" pitchFamily="18" charset="2"/>
               </a:rPr>
               <a:t> = 211</a:t>
@@ -13976,24 +13980,24 @@
               </a:spcBef>
             </a:pPr>
             <a:r>
-              <a:rPr lang="en-US">
+              <a:rPr lang="en-US" dirty="0">
                 <a:sym typeface="Symbol" pitchFamily="18" charset="2"/>
               </a:rPr>
               <a:t>H</a:t>
             </a:r>
             <a:r>
-              <a:rPr lang="en-US" baseline="-25000">
+              <a:rPr lang="en-US" baseline="-25000" dirty="0">
                 <a:sym typeface="Symbol" pitchFamily="18" charset="2"/>
               </a:rPr>
               <a:t>A</a:t>
             </a:r>
             <a:r>
-              <a:rPr lang="en-US">
+              <a:rPr lang="en-US" dirty="0">
                 <a:sym typeface="Symbol" pitchFamily="18" charset="2"/>
               </a:rPr>
               <a:t>  :  &gt; 211</a:t>
             </a:r>
-            <a:endParaRPr lang="en-US"/>
+            <a:endParaRPr lang="en-US" dirty="0"/>
           </a:p>
           <a:p>
             <a:pPr algn="just">
@@ -14001,7 +14005,7 @@
                 <a:spcPct val="50000"/>
               </a:spcBef>
             </a:pPr>
-            <a:endParaRPr lang="en-US"/>
+            <a:endParaRPr lang="en-US" dirty="0"/>
           </a:p>
           <a:p>
             <a:pPr algn="just">
@@ -14010,11 +14014,11 @@
               </a:spcBef>
             </a:pPr>
             <a:r>
-              <a:rPr lang="en-US"/>
+              <a:rPr lang="en-US" dirty="0"/>
               <a:t>Given this, an </a:t>
             </a:r>
             <a:r>
-              <a:rPr lang="en-US">
+              <a:rPr lang="en-US" dirty="0">
                 <a:sym typeface="Symbol" pitchFamily="18" charset="2"/>
               </a:rPr>
               <a:t> = 0.05 test would reject when</a:t>
@@ -14026,7 +14030,7 @@
                 <a:spcPct val="50000"/>
               </a:spcBef>
             </a:pPr>
-            <a:endParaRPr lang="en-US">
+            <a:endParaRPr lang="en-US" dirty="0">
               <a:sym typeface="Symbol" pitchFamily="18" charset="2"/>
             </a:endParaRPr>
           </a:p>
@@ -14036,7 +14040,7 @@
                 <a:spcPct val="50000"/>
               </a:spcBef>
             </a:pPr>
-            <a:endParaRPr lang="en-US">
+            <a:endParaRPr lang="en-US" dirty="0">
               <a:sym typeface="Symbol" pitchFamily="18" charset="2"/>
             </a:endParaRPr>
           </a:p>
@@ -14047,7 +14051,7 @@
               </a:spcBef>
             </a:pPr>
             <a:r>
-              <a:rPr lang="en-US">
+              <a:rPr lang="en-US" dirty="0">
                 <a:sym typeface="Symbol" pitchFamily="18" charset="2"/>
               </a:rPr>
               <a:t>We put all the probability on “one-side”.</a:t>
@@ -14059,7 +14063,7 @@
                 <a:spcPct val="50000"/>
               </a:spcBef>
             </a:pPr>
-            <a:endParaRPr lang="en-US">
+            <a:endParaRPr lang="en-US" dirty="0">
               <a:sym typeface="Symbol" pitchFamily="18" charset="2"/>
             </a:endParaRPr>
           </a:p>
@@ -14070,19 +14074,19 @@
               </a:spcBef>
             </a:pPr>
             <a:r>
-              <a:rPr lang="en-US">
+              <a:rPr lang="en-US" dirty="0">
                 <a:sym typeface="Symbol" pitchFamily="18" charset="2"/>
               </a:rPr>
               <a:t>The </a:t>
             </a:r>
             <a:r>
-              <a:rPr lang="en-US" u="sng">
+              <a:rPr lang="en-US" u="sng" dirty="0">
                 <a:sym typeface="Symbol" pitchFamily="18" charset="2"/>
               </a:rPr>
               <a:t>p-value</a:t>
             </a:r>
             <a:r>
-              <a:rPr lang="en-US">
+              <a:rPr lang="en-US" dirty="0">
                 <a:sym typeface="Symbol" pitchFamily="18" charset="2"/>
               </a:rPr>
               <a:t> would be half of the previous,</a:t>
@@ -14095,7 +14099,7 @@
               </a:spcBef>
             </a:pPr>
             <a:r>
-              <a:rPr lang="en-US">
+              <a:rPr lang="en-US" dirty="0">
                 <a:sym typeface="Symbol" pitchFamily="18" charset="2"/>
               </a:rPr>
               <a:t>p-value = P[      &gt; 220]</a:t>
@@ -14108,12 +14112,12 @@
               </a:spcBef>
             </a:pPr>
             <a:r>
-              <a:rPr lang="en-US">
+              <a:rPr lang="en-US" dirty="0">
                 <a:sym typeface="Symbol" pitchFamily="18" charset="2"/>
               </a:rPr>
               <a:t>= .163</a:t>
             </a:r>
-            <a:endParaRPr lang="en-US"/>
+            <a:endParaRPr lang="en-US" dirty="0"/>
           </a:p>
         </p:txBody>
       </p:sp>
@@ -14133,7 +14137,7 @@
           <a:graphicData uri="http://schemas.openxmlformats.org/presentationml/2006/ole">
             <mc:AlternateContent xmlns:mc="http://schemas.openxmlformats.org/markup-compatibility/2006">
               <mc:Choice xmlns:v="urn:schemas-microsoft-com:vml" Requires="v">
-                <p:oleObj spid="_x0000_s21546" name="Equation" r:id="rId3" imgW="2857500" imgH="647700" progId="Equation.3">
+                <p:oleObj spid="_x0000_s21553" name="Equation" r:id="rId3" imgW="2857500" imgH="647700" progId="Equation.3">
                   <p:embed/>
                 </p:oleObj>
               </mc:Choice>
@@ -14176,14 +14180,14 @@
                       <a:effectLst/>
                       <a:extLst>
                         <a:ext uri="{909E8E84-426E-40dd-AFC4-6F175D3DCCD1}">
-                          <a14:hiddenFill xmlns:a14="http://schemas.microsoft.com/office/drawing/2010/main" xmlns="">
+                          <a14:hiddenFill xmlns="" xmlns:a14="http://schemas.microsoft.com/office/drawing/2010/main">
                             <a:solidFill>
                               <a:srgbClr val="FFFFFF"/>
                             </a:solidFill>
                           </a14:hiddenFill>
                         </a:ext>
                         <a:ext uri="{91240B29-F687-4f45-9708-019B960494DF}">
-                          <a14:hiddenLine xmlns:a14="http://schemas.microsoft.com/office/drawing/2010/main" xmlns="" w="9525">
+                          <a14:hiddenLine xmlns="" xmlns:a14="http://schemas.microsoft.com/office/drawing/2010/main" w="9525">
                             <a:solidFill>
                               <a:srgbClr val="000000"/>
                             </a:solidFill>
@@ -14193,7 +14197,7 @@
                           </a14:hiddenLine>
                         </a:ext>
                         <a:ext uri="{AF507438-7753-43e0-B8FC-AC1667EBCBE1}">
-                          <a14:hiddenEffects xmlns:a14="http://schemas.microsoft.com/office/drawing/2010/main" xmlns="">
+                          <a14:hiddenEffects xmlns="" xmlns:a14="http://schemas.microsoft.com/office/drawing/2010/main">
                             <a:effectLst>
                               <a:outerShdw dist="35921" dir="2700000" algn="ctr" rotWithShape="0">
                                 <a:srgbClr val="808080"/>
@@ -14226,7 +14230,7 @@
           <a:graphicData uri="http://schemas.openxmlformats.org/presentationml/2006/ole">
             <mc:AlternateContent xmlns:mc="http://schemas.openxmlformats.org/markup-compatibility/2006">
               <mc:Choice xmlns:v="urn:schemas-microsoft-com:vml" Requires="v">
-                <p:oleObj spid="_x0000_s21547" name="Equation" r:id="rId5" imgW="253890" imgH="279279" progId="Equation.3">
+                <p:oleObj spid="_x0000_s21554" name="Equation" r:id="rId5" imgW="253890" imgH="279279" progId="Equation.3">
                   <p:embed/>
                 </p:oleObj>
               </mc:Choice>
@@ -14269,14 +14273,14 @@
                       <a:effectLst/>
                       <a:extLst>
                         <a:ext uri="{909E8E84-426E-40dd-AFC4-6F175D3DCCD1}">
-                          <a14:hiddenFill xmlns:a14="http://schemas.microsoft.com/office/drawing/2010/main" xmlns="">
+                          <a14:hiddenFill xmlns="" xmlns:a14="http://schemas.microsoft.com/office/drawing/2010/main">
                             <a:solidFill>
                               <a:srgbClr val="FFFFFF"/>
                             </a:solidFill>
                           </a14:hiddenFill>
                         </a:ext>
                         <a:ext uri="{91240B29-F687-4f45-9708-019B960494DF}">
-                          <a14:hiddenLine xmlns:a14="http://schemas.microsoft.com/office/drawing/2010/main" xmlns="" w="9525">
+                          <a14:hiddenLine xmlns="" xmlns:a14="http://schemas.microsoft.com/office/drawing/2010/main" w="9525">
                             <a:solidFill>
                               <a:srgbClr val="000000"/>
                             </a:solidFill>
@@ -14286,7 +14290,7 @@
                           </a14:hiddenLine>
                         </a:ext>
                         <a:ext uri="{AF507438-7753-43e0-B8FC-AC1667EBCBE1}">
-                          <a14:hiddenEffects xmlns:a14="http://schemas.microsoft.com/office/drawing/2010/main" xmlns="">
+                          <a14:hiddenEffects xmlns="" xmlns:a14="http://schemas.microsoft.com/office/drawing/2010/main">
                             <a:effectLst>
                               <a:outerShdw dist="35921" dir="2700000" algn="ctr" rotWithShape="0">
                                 <a:srgbClr val="808080"/>
@@ -14303,6 +14307,38 @@
           </a:graphicData>
         </a:graphic>
       </p:graphicFrame>
+      <p:sp>
+        <p:nvSpPr>
+          <p:cNvPr id="2" name="Rectangle 1"/>
+          <p:cNvSpPr/>
+          <p:nvPr/>
+        </p:nvSpPr>
+        <p:spPr>
+          <a:xfrm>
+            <a:off x="4220695" y="2664922"/>
+            <a:ext cx="2531409" cy="1631216"/>
+          </a:xfrm>
+          <a:prstGeom prst="rect">
+            <a:avLst/>
+          </a:prstGeom>
+        </p:spPr>
+        <p:txBody>
+          <a:bodyPr wrap="square">
+            <a:spAutoFit/>
+          </a:bodyPr>
+          <a:lstStyle/>
+          <a:p>
+            <a:r>
+              <a:rPr lang="en-US" dirty="0">
+                <a:solidFill>
+                  <a:srgbClr val="7030A0"/>
+                </a:solidFill>
+              </a:rPr>
+              <a:t>When do one vs two sided? If a small or large value would change the direction of your research? </a:t>
+            </a:r>
+          </a:p>
+        </p:txBody>
+      </p:sp>
     </p:spTree>
   </p:cSld>
   <p:clrMapOvr>
@@ -14737,14 +14773,14 @@
           <a:effectLst/>
           <a:extLst>
             <a:ext uri="{909E8E84-426E-40dd-AFC4-6F175D3DCCD1}">
-              <a14:hiddenFill xmlns:a14="http://schemas.microsoft.com/office/drawing/2010/main" xmlns="">
+              <a14:hiddenFill xmlns="" xmlns:a14="http://schemas.microsoft.com/office/drawing/2010/main">
                 <a:solidFill>
                   <a:schemeClr val="accent1"/>
                 </a:solidFill>
               </a14:hiddenFill>
             </a:ext>
             <a:ext uri="{91240B29-F687-4f45-9708-019B960494DF}">
-              <a14:hiddenLine xmlns:a14="http://schemas.microsoft.com/office/drawing/2010/main" xmlns="" w="9525">
+              <a14:hiddenLine xmlns="" xmlns:a14="http://schemas.microsoft.com/office/drawing/2010/main" w="9525">
                 <a:solidFill>
                   <a:schemeClr val="tx1"/>
                 </a:solidFill>
@@ -14754,7 +14790,7 @@
               </a14:hiddenLine>
             </a:ext>
             <a:ext uri="{AF507438-7753-43e0-B8FC-AC1667EBCBE1}">
-              <a14:hiddenEffects xmlns:a14="http://schemas.microsoft.com/office/drawing/2010/main" xmlns="">
+              <a14:hiddenEffects xmlns="" xmlns:a14="http://schemas.microsoft.com/office/drawing/2010/main">
                 <a:effectLst>
                   <a:outerShdw dist="35921" dir="2700000" algn="ctr" rotWithShape="0">
                     <a:schemeClr val="bg2"/>
@@ -15186,14 +15222,14 @@
           <a:effectLst/>
           <a:extLst>
             <a:ext uri="{909E8E84-426E-40dd-AFC4-6F175D3DCCD1}">
-              <a14:hiddenFill xmlns:a14="http://schemas.microsoft.com/office/drawing/2010/main" xmlns="">
+              <a14:hiddenFill xmlns="" xmlns:a14="http://schemas.microsoft.com/office/drawing/2010/main">
                 <a:solidFill>
                   <a:schemeClr val="accent1"/>
                 </a:solidFill>
               </a14:hiddenFill>
             </a:ext>
             <a:ext uri="{91240B29-F687-4f45-9708-019B960494DF}">
-              <a14:hiddenLine xmlns:a14="http://schemas.microsoft.com/office/drawing/2010/main" xmlns="" w="9525">
+              <a14:hiddenLine xmlns="" xmlns:a14="http://schemas.microsoft.com/office/drawing/2010/main" w="9525">
                 <a:solidFill>
                   <a:schemeClr val="tx1"/>
                 </a:solidFill>
@@ -15203,7 +15239,7 @@
               </a14:hiddenLine>
             </a:ext>
             <a:ext uri="{AF507438-7753-43e0-B8FC-AC1667EBCBE1}">
-              <a14:hiddenEffects xmlns:a14="http://schemas.microsoft.com/office/drawing/2010/main" xmlns="">
+              <a14:hiddenEffects xmlns="" xmlns:a14="http://schemas.microsoft.com/office/drawing/2010/main">
                 <a:effectLst>
                   <a:outerShdw dist="35921" dir="2700000" algn="ctr" rotWithShape="0">
                     <a:schemeClr val="bg2"/>
@@ -15363,12 +15399,12 @@
           <a:effectLst/>
           <a:extLst>
             <a:ext uri="{909E8E84-426E-40dd-AFC4-6F175D3DCCD1}">
-              <a14:hiddenFill xmlns:a14="http://schemas.microsoft.com/office/drawing/2010/main" xmlns="">
+              <a14:hiddenFill xmlns="" xmlns:a14="http://schemas.microsoft.com/office/drawing/2010/main">
                 <a:noFill/>
               </a14:hiddenFill>
             </a:ext>
             <a:ext uri="{AF507438-7753-43e0-B8FC-AC1667EBCBE1}">
-              <a14:hiddenEffects xmlns:a14="http://schemas.microsoft.com/office/drawing/2010/main" xmlns="">
+              <a14:hiddenEffects xmlns="" xmlns:a14="http://schemas.microsoft.com/office/drawing/2010/main">
                 <a:effectLst>
                   <a:outerShdw dist="35921" dir="2700000" algn="ctr" rotWithShape="0">
                     <a:schemeClr val="bg2"/>
@@ -15402,7 +15438,7 @@
           <a:graphicData uri="http://schemas.openxmlformats.org/presentationml/2006/ole">
             <mc:AlternateContent xmlns:mc="http://schemas.openxmlformats.org/markup-compatibility/2006">
               <mc:Choice xmlns:v="urn:schemas-microsoft-com:vml" Requires="v">
-                <p:oleObj spid="_x0000_s5146" name="Equation" r:id="rId3" imgW="152268" imgH="304536" progId="Equation.COEE2">
+                <p:oleObj spid="_x0000_s5150" name="Equation" r:id="rId3" imgW="152268" imgH="304536" progId="Equation.COEE2">
                   <p:embed/>
                 </p:oleObj>
               </mc:Choice>
@@ -15445,14 +15481,14 @@
                       <a:effectLst/>
                       <a:extLst>
                         <a:ext uri="{909E8E84-426E-40dd-AFC4-6F175D3DCCD1}">
-                          <a14:hiddenFill xmlns:a14="http://schemas.microsoft.com/office/drawing/2010/main" xmlns="">
+                          <a14:hiddenFill xmlns="" xmlns:a14="http://schemas.microsoft.com/office/drawing/2010/main">
                             <a:solidFill>
                               <a:srgbClr val="FFFFFF"/>
                             </a:solidFill>
                           </a14:hiddenFill>
                         </a:ext>
                         <a:ext uri="{91240B29-F687-4f45-9708-019B960494DF}">
-                          <a14:hiddenLine xmlns:a14="http://schemas.microsoft.com/office/drawing/2010/main" xmlns="" w="9525">
+                          <a14:hiddenLine xmlns="" xmlns:a14="http://schemas.microsoft.com/office/drawing/2010/main" w="9525">
                             <a:solidFill>
                               <a:srgbClr val="000000"/>
                             </a:solidFill>
@@ -15462,7 +15498,7 @@
                           </a14:hiddenLine>
                         </a:ext>
                         <a:ext uri="{AF507438-7753-43e0-B8FC-AC1667EBCBE1}">
-                          <a14:hiddenEffects xmlns:a14="http://schemas.microsoft.com/office/drawing/2010/main" xmlns="">
+                          <a14:hiddenEffects xmlns="" xmlns:a14="http://schemas.microsoft.com/office/drawing/2010/main">
                             <a:effectLst>
                               <a:outerShdw dist="35921" dir="2700000" algn="ctr" rotWithShape="0">
                                 <a:srgbClr val="808080"/>
@@ -15502,14 +15538,14 @@
           <a:effectLst/>
           <a:extLst>
             <a:ext uri="{909E8E84-426E-40dd-AFC4-6F175D3DCCD1}">
-              <a14:hiddenFill xmlns:a14="http://schemas.microsoft.com/office/drawing/2010/main" xmlns="">
+              <a14:hiddenFill xmlns="" xmlns:a14="http://schemas.microsoft.com/office/drawing/2010/main">
                 <a:solidFill>
                   <a:schemeClr val="accent1"/>
                 </a:solidFill>
               </a14:hiddenFill>
             </a:ext>
             <a:ext uri="{91240B29-F687-4f45-9708-019B960494DF}">
-              <a14:hiddenLine xmlns:a14="http://schemas.microsoft.com/office/drawing/2010/main" xmlns="" w="9525">
+              <a14:hiddenLine xmlns="" xmlns:a14="http://schemas.microsoft.com/office/drawing/2010/main" w="9525">
                 <a:solidFill>
                   <a:schemeClr val="tx1"/>
                 </a:solidFill>
@@ -15519,7 +15555,7 @@
               </a14:hiddenLine>
             </a:ext>
             <a:ext uri="{AF507438-7753-43e0-B8FC-AC1667EBCBE1}">
-              <a14:hiddenEffects xmlns:a14="http://schemas.microsoft.com/office/drawing/2010/main" xmlns="">
+              <a14:hiddenEffects xmlns="" xmlns:a14="http://schemas.microsoft.com/office/drawing/2010/main">
                 <a:effectLst>
                   <a:outerShdw dist="35921" dir="2700000" algn="ctr" rotWithShape="0">
                     <a:schemeClr val="bg2"/>
@@ -16119,14 +16155,14 @@
           <a:effectLst/>
           <a:extLst>
             <a:ext uri="{909E8E84-426E-40dd-AFC4-6F175D3DCCD1}">
-              <a14:hiddenFill xmlns:a14="http://schemas.microsoft.com/office/drawing/2010/main" xmlns="">
+              <a14:hiddenFill xmlns="" xmlns:a14="http://schemas.microsoft.com/office/drawing/2010/main">
                 <a:solidFill>
                   <a:schemeClr val="accent1"/>
                 </a:solidFill>
               </a14:hiddenFill>
             </a:ext>
             <a:ext uri="{91240B29-F687-4f45-9708-019B960494DF}">
-              <a14:hiddenLine xmlns:a14="http://schemas.microsoft.com/office/drawing/2010/main" xmlns="" w="9525">
+              <a14:hiddenLine xmlns="" xmlns:a14="http://schemas.microsoft.com/office/drawing/2010/main" w="9525">
                 <a:solidFill>
                   <a:schemeClr val="tx1"/>
                 </a:solidFill>
@@ -16136,7 +16172,7 @@
               </a14:hiddenLine>
             </a:ext>
             <a:ext uri="{AF507438-7753-43e0-B8FC-AC1667EBCBE1}">
-              <a14:hiddenEffects xmlns:a14="http://schemas.microsoft.com/office/drawing/2010/main" xmlns="">
+              <a14:hiddenEffects xmlns="" xmlns:a14="http://schemas.microsoft.com/office/drawing/2010/main">
                 <a:effectLst>
                   <a:outerShdw dist="35921" dir="2700000" algn="ctr" rotWithShape="0">
                     <a:schemeClr val="bg2"/>
@@ -16285,12 +16321,12 @@
           <a:effectLst/>
           <a:extLst>
             <a:ext uri="{909E8E84-426E-40dd-AFC4-6F175D3DCCD1}">
-              <a14:hiddenFill xmlns:a14="http://schemas.microsoft.com/office/drawing/2010/main" xmlns="">
+              <a14:hiddenFill xmlns="" xmlns:a14="http://schemas.microsoft.com/office/drawing/2010/main">
                 <a:noFill/>
               </a14:hiddenFill>
             </a:ext>
             <a:ext uri="{AF507438-7753-43e0-B8FC-AC1667EBCBE1}">
-              <a14:hiddenEffects xmlns:a14="http://schemas.microsoft.com/office/drawing/2010/main" xmlns="">
+              <a14:hiddenEffects xmlns="" xmlns:a14="http://schemas.microsoft.com/office/drawing/2010/main">
                 <a:effectLst>
                   <a:outerShdw dist="35921" dir="2700000" algn="ctr" rotWithShape="0">
                     <a:schemeClr val="bg2"/>
@@ -16331,14 +16367,14 @@
           <a:effectLst/>
           <a:extLst>
             <a:ext uri="{909E8E84-426E-40dd-AFC4-6F175D3DCCD1}">
-              <a14:hiddenFill xmlns:a14="http://schemas.microsoft.com/office/drawing/2010/main" xmlns="">
+              <a14:hiddenFill xmlns="" xmlns:a14="http://schemas.microsoft.com/office/drawing/2010/main">
                 <a:solidFill>
                   <a:schemeClr val="accent1"/>
                 </a:solidFill>
               </a14:hiddenFill>
             </a:ext>
             <a:ext uri="{91240B29-F687-4f45-9708-019B960494DF}">
-              <a14:hiddenLine xmlns:a14="http://schemas.microsoft.com/office/drawing/2010/main" xmlns="" w="9525">
+              <a14:hiddenLine xmlns="" xmlns:a14="http://schemas.microsoft.com/office/drawing/2010/main" w="9525">
                 <a:solidFill>
                   <a:schemeClr val="tx1"/>
                 </a:solidFill>
@@ -16348,7 +16384,7 @@
               </a14:hiddenLine>
             </a:ext>
             <a:ext uri="{AF507438-7753-43e0-B8FC-AC1667EBCBE1}">
-              <a14:hiddenEffects xmlns:a14="http://schemas.microsoft.com/office/drawing/2010/main" xmlns="">
+              <a14:hiddenEffects xmlns="" xmlns:a14="http://schemas.microsoft.com/office/drawing/2010/main">
                 <a:effectLst>
                   <a:outerShdw dist="35921" dir="2700000" algn="ctr" rotWithShape="0">
                     <a:schemeClr val="bg2"/>
@@ -16607,6 +16643,129 @@
                 <a:sym typeface="Symbol" pitchFamily="18" charset="2"/>
               </a:rPr>
               <a:t>6.	Interpret the result</a:t>
+            </a:r>
+          </a:p>
+        </p:txBody>
+      </p:sp>
+      <p:sp>
+        <p:nvSpPr>
+          <p:cNvPr id="2" name="TextBox 1"/>
+          <p:cNvSpPr txBox="1"/>
+          <p:nvPr/>
+        </p:nvSpPr>
+        <p:spPr>
+          <a:xfrm>
+            <a:off x="995083" y="6721475"/>
+            <a:ext cx="4867834" cy="1384995"/>
+          </a:xfrm>
+          <a:prstGeom prst="rect">
+            <a:avLst/>
+          </a:prstGeom>
+          <a:noFill/>
+        </p:spPr>
+        <p:txBody>
+          <a:bodyPr wrap="square" rtlCol="0">
+            <a:spAutoFit/>
+          </a:bodyPr>
+          <a:lstStyle/>
+          <a:p>
+            <a:r>
+              <a:rPr lang="en-US" sz="1400" dirty="0">
+                <a:solidFill>
+                  <a:srgbClr val="7030A0"/>
+                </a:solidFill>
+              </a:rPr>
+              <a:t>Other things to </a:t>
+            </a:r>
+            <a:r>
+              <a:rPr lang="en-US" sz="1400" dirty="0" smtClean="0">
+                <a:solidFill>
+                  <a:srgbClr val="7030A0"/>
+                </a:solidFill>
+              </a:rPr>
+              <a:t>note</a:t>
+            </a:r>
+          </a:p>
+          <a:p>
+            <a:pPr marL="342900" indent="-342900">
+              <a:buFontTx/>
+              <a:buChar char="-"/>
+            </a:pPr>
+            <a:r>
+              <a:rPr lang="en-US" sz="1400" dirty="0" smtClean="0">
+                <a:solidFill>
+                  <a:srgbClr val="7030A0"/>
+                </a:solidFill>
+              </a:rPr>
+              <a:t>General </a:t>
+            </a:r>
+            <a:r>
+              <a:rPr lang="en-US" sz="1400" dirty="0">
+                <a:solidFill>
+                  <a:srgbClr val="7030A0"/>
+                </a:solidFill>
+              </a:rPr>
+              <a:t>idea (compare p-value of test statistic to cutoff) is same for all hypothesis </a:t>
+            </a:r>
+            <a:r>
+              <a:rPr lang="en-US" sz="1400" dirty="0" smtClean="0">
+                <a:solidFill>
+                  <a:srgbClr val="7030A0"/>
+                </a:solidFill>
+              </a:rPr>
+              <a:t>tests</a:t>
+            </a:r>
+          </a:p>
+          <a:p>
+            <a:pPr marL="342900" indent="-342900">
+              <a:buFontTx/>
+              <a:buChar char="-"/>
+            </a:pPr>
+            <a:r>
+              <a:rPr lang="en-US" sz="1400" dirty="0" smtClean="0">
+                <a:solidFill>
+                  <a:srgbClr val="7030A0"/>
+                </a:solidFill>
+              </a:rPr>
+              <a:t>- </a:t>
+            </a:r>
+            <a:r>
+              <a:rPr lang="en-US" sz="1400" dirty="0">
+                <a:solidFill>
+                  <a:srgbClr val="7030A0"/>
+                </a:solidFill>
+              </a:rPr>
+              <a:t>The test stat and distribution changes for different tests (regression parameters, proportions, etc</a:t>
+            </a:r>
+            <a:r>
+              <a:rPr lang="en-US" sz="1400" dirty="0" smtClean="0">
+                <a:solidFill>
+                  <a:srgbClr val="7030A0"/>
+                </a:solidFill>
+              </a:rPr>
+              <a:t>.)</a:t>
+            </a:r>
+          </a:p>
+          <a:p>
+            <a:pPr marL="342900" indent="-342900">
+              <a:buFontTx/>
+              <a:buChar char="-"/>
+            </a:pPr>
+            <a:r>
+              <a:rPr lang="en-US" sz="1400" dirty="0" smtClean="0">
+                <a:solidFill>
+                  <a:srgbClr val="7030A0"/>
+                </a:solidFill>
+              </a:rPr>
+              <a:t>- </a:t>
+            </a:r>
+            <a:r>
+              <a:rPr lang="en-US" sz="1400" dirty="0">
+                <a:solidFill>
+                  <a:srgbClr val="7030A0"/>
+                </a:solidFill>
+              </a:rPr>
+              <a:t>Bayesians take a different approach to hypothesis testing</a:t>
             </a:r>
           </a:p>
         </p:txBody>
@@ -17032,14 +17191,14 @@
           <a:effectLst/>
           <a:extLst>
             <a:ext uri="{909E8E84-426E-40dd-AFC4-6F175D3DCCD1}">
-              <a14:hiddenFill xmlns:a14="http://schemas.microsoft.com/office/drawing/2010/main" xmlns="">
+              <a14:hiddenFill xmlns="" xmlns:a14="http://schemas.microsoft.com/office/drawing/2010/main">
                 <a:solidFill>
                   <a:schemeClr val="accent1"/>
                 </a:solidFill>
               </a14:hiddenFill>
             </a:ext>
             <a:ext uri="{91240B29-F687-4f45-9708-019B960494DF}">
-              <a14:hiddenLine xmlns:a14="http://schemas.microsoft.com/office/drawing/2010/main" xmlns="" w="9525">
+              <a14:hiddenLine xmlns="" xmlns:a14="http://schemas.microsoft.com/office/drawing/2010/main" w="9525">
                 <a:solidFill>
                   <a:schemeClr val="tx1"/>
                 </a:solidFill>
@@ -17049,7 +17208,7 @@
               </a14:hiddenLine>
             </a:ext>
             <a:ext uri="{AF507438-7753-43e0-B8FC-AC1667EBCBE1}">
-              <a14:hiddenEffects xmlns:a14="http://schemas.microsoft.com/office/drawing/2010/main" xmlns="">
+              <a14:hiddenEffects xmlns="" xmlns:a14="http://schemas.microsoft.com/office/drawing/2010/main">
                 <a:effectLst>
                   <a:outerShdw dist="35921" dir="2700000" algn="ctr" rotWithShape="0">
                     <a:schemeClr val="bg2"/>
@@ -17209,12 +17368,12 @@
           <a:effectLst/>
           <a:extLst>
             <a:ext uri="{909E8E84-426E-40dd-AFC4-6F175D3DCCD1}">
-              <a14:hiddenFill xmlns:a14="http://schemas.microsoft.com/office/drawing/2010/main" xmlns="">
+              <a14:hiddenFill xmlns="" xmlns:a14="http://schemas.microsoft.com/office/drawing/2010/main">
                 <a:noFill/>
               </a14:hiddenFill>
             </a:ext>
             <a:ext uri="{AF507438-7753-43e0-B8FC-AC1667EBCBE1}">
-              <a14:hiddenEffects xmlns:a14="http://schemas.microsoft.com/office/drawing/2010/main" xmlns="">
+              <a14:hiddenEffects xmlns="" xmlns:a14="http://schemas.microsoft.com/office/drawing/2010/main">
                 <a:effectLst>
                   <a:outerShdw dist="35921" dir="2700000" algn="ctr" rotWithShape="0">
                     <a:schemeClr val="bg2"/>
@@ -17255,14 +17414,14 @@
           <a:effectLst/>
           <a:extLst>
             <a:ext uri="{909E8E84-426E-40dd-AFC4-6F175D3DCCD1}">
-              <a14:hiddenFill xmlns:a14="http://schemas.microsoft.com/office/drawing/2010/main" xmlns="">
+              <a14:hiddenFill xmlns="" xmlns:a14="http://schemas.microsoft.com/office/drawing/2010/main">
                 <a:solidFill>
                   <a:schemeClr val="accent1"/>
                 </a:solidFill>
               </a14:hiddenFill>
             </a:ext>
             <a:ext uri="{91240B29-F687-4f45-9708-019B960494DF}">
-              <a14:hiddenLine xmlns:a14="http://schemas.microsoft.com/office/drawing/2010/main" xmlns="" w="9525">
+              <a14:hiddenLine xmlns="" xmlns:a14="http://schemas.microsoft.com/office/drawing/2010/main" w="9525">
                 <a:solidFill>
                   <a:schemeClr val="tx1"/>
                 </a:solidFill>
@@ -17272,7 +17431,7 @@
               </a14:hiddenLine>
             </a:ext>
             <a:ext uri="{AF507438-7753-43e0-B8FC-AC1667EBCBE1}">
-              <a14:hiddenEffects xmlns:a14="http://schemas.microsoft.com/office/drawing/2010/main" xmlns="">
+              <a14:hiddenEffects xmlns="" xmlns:a14="http://schemas.microsoft.com/office/drawing/2010/main">
                 <a:effectLst>
                   <a:outerShdw dist="35921" dir="2700000" algn="ctr" rotWithShape="0">
                     <a:schemeClr val="bg2"/>
@@ -17450,14 +17609,14 @@
           <a:effectLst/>
           <a:extLst>
             <a:ext uri="{909E8E84-426E-40dd-AFC4-6F175D3DCCD1}">
-              <a14:hiddenFill xmlns:a14="http://schemas.microsoft.com/office/drawing/2010/main" xmlns="">
+              <a14:hiddenFill xmlns="" xmlns:a14="http://schemas.microsoft.com/office/drawing/2010/main">
                 <a:solidFill>
                   <a:schemeClr val="accent1"/>
                 </a:solidFill>
               </a14:hiddenFill>
             </a:ext>
             <a:ext uri="{91240B29-F687-4f45-9708-019B960494DF}">
-              <a14:hiddenLine xmlns:a14="http://schemas.microsoft.com/office/drawing/2010/main" xmlns="" w="9525">
+              <a14:hiddenLine xmlns="" xmlns:a14="http://schemas.microsoft.com/office/drawing/2010/main" w="9525">
                 <a:solidFill>
                   <a:schemeClr val="tx1"/>
                 </a:solidFill>
@@ -17467,7 +17626,7 @@
               </a14:hiddenLine>
             </a:ext>
             <a:ext uri="{AF507438-7753-43e0-B8FC-AC1667EBCBE1}">
-              <a14:hiddenEffects xmlns:a14="http://schemas.microsoft.com/office/drawing/2010/main" xmlns="">
+              <a14:hiddenEffects xmlns="" xmlns:a14="http://schemas.microsoft.com/office/drawing/2010/main">
                 <a:effectLst>
                   <a:outerShdw dist="35921" dir="2700000" algn="ctr" rotWithShape="0">
                     <a:schemeClr val="bg2"/>
@@ -17730,7 +17889,7 @@
           <a:graphicData uri="http://schemas.openxmlformats.org/presentationml/2006/ole">
             <mc:AlternateContent xmlns:mc="http://schemas.openxmlformats.org/markup-compatibility/2006">
               <mc:Choice xmlns:v="urn:schemas-microsoft-com:vml" Requires="v">
-                <p:oleObj spid="_x0000_s6187" name="Equation" r:id="rId3" imgW="253890" imgH="279279" progId="Equation.3">
+                <p:oleObj spid="_x0000_s6194" name="Equation" r:id="rId3" imgW="253890" imgH="279279" progId="Equation.3">
                   <p:embed/>
                 </p:oleObj>
               </mc:Choice>
@@ -17773,14 +17932,14 @@
                       <a:effectLst/>
                       <a:extLst>
                         <a:ext uri="{909E8E84-426E-40dd-AFC4-6F175D3DCCD1}">
-                          <a14:hiddenFill xmlns:a14="http://schemas.microsoft.com/office/drawing/2010/main" xmlns="">
+                          <a14:hiddenFill xmlns="" xmlns:a14="http://schemas.microsoft.com/office/drawing/2010/main">
                             <a:solidFill>
                               <a:srgbClr val="FFFFFF"/>
                             </a:solidFill>
                           </a14:hiddenFill>
                         </a:ext>
                         <a:ext uri="{91240B29-F687-4f45-9708-019B960494DF}">
-                          <a14:hiddenLine xmlns:a14="http://schemas.microsoft.com/office/drawing/2010/main" xmlns="" w="9525">
+                          <a14:hiddenLine xmlns="" xmlns:a14="http://schemas.microsoft.com/office/drawing/2010/main" w="9525">
                             <a:solidFill>
                               <a:srgbClr val="000000"/>
                             </a:solidFill>
@@ -17790,7 +17949,7 @@
                           </a14:hiddenLine>
                         </a:ext>
                         <a:ext uri="{AF507438-7753-43e0-B8FC-AC1667EBCBE1}">
-                          <a14:hiddenEffects xmlns:a14="http://schemas.microsoft.com/office/drawing/2010/main" xmlns="">
+                          <a14:hiddenEffects xmlns="" xmlns:a14="http://schemas.microsoft.com/office/drawing/2010/main">
                             <a:effectLst>
                               <a:outerShdw dist="35921" dir="2700000" algn="ctr" rotWithShape="0">
                                 <a:srgbClr val="808080"/>
@@ -17829,7 +17988,7 @@
           <a:graphicData uri="http://schemas.openxmlformats.org/presentationml/2006/ole">
             <mc:AlternateContent xmlns:mc="http://schemas.openxmlformats.org/markup-compatibility/2006">
               <mc:Choice xmlns:v="urn:schemas-microsoft-com:vml" Requires="v">
-                <p:oleObj spid="_x0000_s6188" name="Equation" r:id="rId5" imgW="253890" imgH="279279" progId="Equation.3">
+                <p:oleObj spid="_x0000_s6195" name="Equation" r:id="rId5" imgW="253890" imgH="279279" progId="Equation.3">
                   <p:embed/>
                 </p:oleObj>
               </mc:Choice>
@@ -17872,14 +18031,14 @@
                       <a:effectLst/>
                       <a:extLst>
                         <a:ext uri="{909E8E84-426E-40dd-AFC4-6F175D3DCCD1}">
-                          <a14:hiddenFill xmlns:a14="http://schemas.microsoft.com/office/drawing/2010/main" xmlns="">
+                          <a14:hiddenFill xmlns="" xmlns:a14="http://schemas.microsoft.com/office/drawing/2010/main">
                             <a:solidFill>
                               <a:srgbClr val="FFFFFF"/>
                             </a:solidFill>
                           </a14:hiddenFill>
                         </a:ext>
                         <a:ext uri="{91240B29-F687-4f45-9708-019B960494DF}">
-                          <a14:hiddenLine xmlns:a14="http://schemas.microsoft.com/office/drawing/2010/main" xmlns="" w="9525">
+                          <a14:hiddenLine xmlns="" xmlns:a14="http://schemas.microsoft.com/office/drawing/2010/main" w="9525">
                             <a:solidFill>
                               <a:srgbClr val="000000"/>
                             </a:solidFill>
@@ -17889,7 +18048,7 @@
                           </a14:hiddenLine>
                         </a:ext>
                         <a:ext uri="{AF507438-7753-43e0-B8FC-AC1667EBCBE1}">
-                          <a14:hiddenEffects xmlns:a14="http://schemas.microsoft.com/office/drawing/2010/main" xmlns="">
+                          <a14:hiddenEffects xmlns="" xmlns:a14="http://schemas.microsoft.com/office/drawing/2010/main">
                             <a:effectLst>
                               <a:outerShdw dist="35921" dir="2700000" algn="ctr" rotWithShape="0">
                                 <a:srgbClr val="808080"/>
@@ -18327,14 +18486,14 @@
           <a:effectLst/>
           <a:extLst>
             <a:ext uri="{909E8E84-426E-40dd-AFC4-6F175D3DCCD1}">
-              <a14:hiddenFill xmlns:a14="http://schemas.microsoft.com/office/drawing/2010/main" xmlns="">
+              <a14:hiddenFill xmlns="" xmlns:a14="http://schemas.microsoft.com/office/drawing/2010/main">
                 <a:solidFill>
                   <a:schemeClr val="accent1"/>
                 </a:solidFill>
               </a14:hiddenFill>
             </a:ext>
             <a:ext uri="{91240B29-F687-4f45-9708-019B960494DF}">
-              <a14:hiddenLine xmlns:a14="http://schemas.microsoft.com/office/drawing/2010/main" xmlns="" w="9525">
+              <a14:hiddenLine xmlns="" xmlns:a14="http://schemas.microsoft.com/office/drawing/2010/main" w="9525">
                 <a:solidFill>
                   <a:schemeClr val="tx1"/>
                 </a:solidFill>
@@ -18344,7 +18503,7 @@
               </a14:hiddenLine>
             </a:ext>
             <a:ext uri="{AF507438-7753-43e0-B8FC-AC1667EBCBE1}">
-              <a14:hiddenEffects xmlns:a14="http://schemas.microsoft.com/office/drawing/2010/main" xmlns="">
+              <a14:hiddenEffects xmlns="" xmlns:a14="http://schemas.microsoft.com/office/drawing/2010/main">
                 <a:effectLst>
                   <a:outerShdw dist="35921" dir="2700000" algn="ctr" rotWithShape="0">
                     <a:schemeClr val="bg2"/>
@@ -18497,12 +18656,12 @@
           <a:effectLst/>
           <a:extLst>
             <a:ext uri="{909E8E84-426E-40dd-AFC4-6F175D3DCCD1}">
-              <a14:hiddenFill xmlns:a14="http://schemas.microsoft.com/office/drawing/2010/main" xmlns="">
+              <a14:hiddenFill xmlns="" xmlns:a14="http://schemas.microsoft.com/office/drawing/2010/main">
                 <a:noFill/>
               </a14:hiddenFill>
             </a:ext>
             <a:ext uri="{AF507438-7753-43e0-B8FC-AC1667EBCBE1}">
-              <a14:hiddenEffects xmlns:a14="http://schemas.microsoft.com/office/drawing/2010/main" xmlns="">
+              <a14:hiddenEffects xmlns="" xmlns:a14="http://schemas.microsoft.com/office/drawing/2010/main">
                 <a:effectLst>
                   <a:outerShdw dist="35921" dir="2700000" algn="ctr" rotWithShape="0">
                     <a:schemeClr val="bg2"/>
@@ -18543,14 +18702,14 @@
           <a:effectLst/>
           <a:extLst>
             <a:ext uri="{909E8E84-426E-40dd-AFC4-6F175D3DCCD1}">
-              <a14:hiddenFill xmlns:a14="http://schemas.microsoft.com/office/drawing/2010/main" xmlns="">
+              <a14:hiddenFill xmlns="" xmlns:a14="http://schemas.microsoft.com/office/drawing/2010/main">
                 <a:solidFill>
                   <a:schemeClr val="accent1"/>
                 </a:solidFill>
               </a14:hiddenFill>
             </a:ext>
             <a:ext uri="{91240B29-F687-4f45-9708-019B960494DF}">
-              <a14:hiddenLine xmlns:a14="http://schemas.microsoft.com/office/drawing/2010/main" xmlns="" w="9525">
+              <a14:hiddenLine xmlns="" xmlns:a14="http://schemas.microsoft.com/office/drawing/2010/main" w="9525">
                 <a:solidFill>
                   <a:schemeClr val="tx1"/>
                 </a:solidFill>
@@ -18560,7 +18719,7 @@
               </a14:hiddenLine>
             </a:ext>
             <a:ext uri="{AF507438-7753-43e0-B8FC-AC1667EBCBE1}">
-              <a14:hiddenEffects xmlns:a14="http://schemas.microsoft.com/office/drawing/2010/main" xmlns="">
+              <a14:hiddenEffects xmlns="" xmlns:a14="http://schemas.microsoft.com/office/drawing/2010/main">
                 <a:effectLst>
                   <a:outerShdw dist="35921" dir="2700000" algn="ctr" rotWithShape="0">
                     <a:schemeClr val="bg2"/>
@@ -19289,14 +19448,14 @@
           <a:effectLst/>
           <a:extLst>
             <a:ext uri="{909E8E84-426E-40dd-AFC4-6F175D3DCCD1}">
-              <a14:hiddenFill xmlns:a14="http://schemas.microsoft.com/office/drawing/2010/main" xmlns="">
+              <a14:hiddenFill xmlns="" xmlns:a14="http://schemas.microsoft.com/office/drawing/2010/main">
                 <a:solidFill>
                   <a:schemeClr val="accent1"/>
                 </a:solidFill>
               </a14:hiddenFill>
             </a:ext>
             <a:ext uri="{91240B29-F687-4f45-9708-019B960494DF}">
-              <a14:hiddenLine xmlns:a14="http://schemas.microsoft.com/office/drawing/2010/main" xmlns="" w="9525">
+              <a14:hiddenLine xmlns="" xmlns:a14="http://schemas.microsoft.com/office/drawing/2010/main" w="9525">
                 <a:solidFill>
                   <a:schemeClr val="tx1"/>
                 </a:solidFill>
@@ -19306,7 +19465,7 @@
               </a14:hiddenLine>
             </a:ext>
             <a:ext uri="{AF507438-7753-43e0-B8FC-AC1667EBCBE1}">
-              <a14:hiddenEffects xmlns:a14="http://schemas.microsoft.com/office/drawing/2010/main" xmlns="">
+              <a14:hiddenEffects xmlns="" xmlns:a14="http://schemas.microsoft.com/office/drawing/2010/main">
                 <a:effectLst>
                   <a:outerShdw dist="35921" dir="2700000" algn="ctr" rotWithShape="0">
                     <a:schemeClr val="bg2"/>
@@ -19459,12 +19618,12 @@
           <a:effectLst/>
           <a:extLst>
             <a:ext uri="{909E8E84-426E-40dd-AFC4-6F175D3DCCD1}">
-              <a14:hiddenFill xmlns:a14="http://schemas.microsoft.com/office/drawing/2010/main" xmlns="">
+              <a14:hiddenFill xmlns="" xmlns:a14="http://schemas.microsoft.com/office/drawing/2010/main">
                 <a:noFill/>
               </a14:hiddenFill>
             </a:ext>
             <a:ext uri="{AF507438-7753-43e0-B8FC-AC1667EBCBE1}">
-              <a14:hiddenEffects xmlns:a14="http://schemas.microsoft.com/office/drawing/2010/main" xmlns="">
+              <a14:hiddenEffects xmlns="" xmlns:a14="http://schemas.microsoft.com/office/drawing/2010/main">
                 <a:effectLst>
                   <a:outerShdw dist="35921" dir="2700000" algn="ctr" rotWithShape="0">
                     <a:schemeClr val="bg2"/>
@@ -19505,14 +19664,14 @@
           <a:effectLst/>
           <a:extLst>
             <a:ext uri="{909E8E84-426E-40dd-AFC4-6F175D3DCCD1}">
-              <a14:hiddenFill xmlns:a14="http://schemas.microsoft.com/office/drawing/2010/main" xmlns="">
+              <a14:hiddenFill xmlns="" xmlns:a14="http://schemas.microsoft.com/office/drawing/2010/main">
                 <a:solidFill>
                   <a:schemeClr val="accent1"/>
                 </a:solidFill>
               </a14:hiddenFill>
             </a:ext>
             <a:ext uri="{91240B29-F687-4f45-9708-019B960494DF}">
-              <a14:hiddenLine xmlns:a14="http://schemas.microsoft.com/office/drawing/2010/main" xmlns="" w="9525">
+              <a14:hiddenLine xmlns="" xmlns:a14="http://schemas.microsoft.com/office/drawing/2010/main" w="9525">
                 <a:solidFill>
                   <a:schemeClr val="tx1"/>
                 </a:solidFill>
@@ -19522,7 +19681,7 @@
               </a14:hiddenLine>
             </a:ext>
             <a:ext uri="{AF507438-7753-43e0-B8FC-AC1667EBCBE1}">
-              <a14:hiddenEffects xmlns:a14="http://schemas.microsoft.com/office/drawing/2010/main" xmlns="">
+              <a14:hiddenEffects xmlns="" xmlns:a14="http://schemas.microsoft.com/office/drawing/2010/main">
                 <a:effectLst>
                   <a:outerShdw dist="35921" dir="2700000" algn="ctr" rotWithShape="0">
                     <a:schemeClr val="bg2"/>
@@ -19722,7 +19881,7 @@
           <a:graphicData uri="http://schemas.openxmlformats.org/presentationml/2006/ole">
             <mc:AlternateContent xmlns:mc="http://schemas.openxmlformats.org/markup-compatibility/2006">
               <mc:Choice xmlns:v="urn:schemas-microsoft-com:vml" Requires="v">
-                <p:oleObj spid="_x0000_s8235" name="Document" r:id="rId3" imgW="1391412" imgH="2048256" progId="Word.Document.8">
+                <p:oleObj spid="_x0000_s8242" name="Document" r:id="rId3" imgW="1391412" imgH="2048256" progId="Word.Document.8">
                   <p:embed/>
                 </p:oleObj>
               </mc:Choice>
@@ -19765,14 +19924,14 @@
                       <a:effectLst/>
                       <a:extLst>
                         <a:ext uri="{909E8E84-426E-40dd-AFC4-6F175D3DCCD1}">
-                          <a14:hiddenFill xmlns:a14="http://schemas.microsoft.com/office/drawing/2010/main" xmlns="">
+                          <a14:hiddenFill xmlns="" xmlns:a14="http://schemas.microsoft.com/office/drawing/2010/main">
                             <a:solidFill>
                               <a:srgbClr val="FFFFFF"/>
                             </a:solidFill>
                           </a14:hiddenFill>
                         </a:ext>
                         <a:ext uri="{91240B29-F687-4f45-9708-019B960494DF}">
-                          <a14:hiddenLine xmlns:a14="http://schemas.microsoft.com/office/drawing/2010/main" xmlns="" w="9525">
+                          <a14:hiddenLine xmlns="" xmlns:a14="http://schemas.microsoft.com/office/drawing/2010/main" w="9525">
                             <a:solidFill>
                               <a:srgbClr val="000000"/>
                             </a:solidFill>
@@ -19782,7 +19941,7 @@
                           </a14:hiddenLine>
                         </a:ext>
                         <a:ext uri="{AF507438-7753-43e0-B8FC-AC1667EBCBE1}">
-                          <a14:hiddenEffects xmlns:a14="http://schemas.microsoft.com/office/drawing/2010/main" xmlns="">
+                          <a14:hiddenEffects xmlns="" xmlns:a14="http://schemas.microsoft.com/office/drawing/2010/main">
                             <a:effectLst>
                               <a:outerShdw dist="35921" dir="2700000" algn="ctr" rotWithShape="0">
                                 <a:srgbClr val="808080"/>
@@ -19815,7 +19974,7 @@
           <a:graphicData uri="http://schemas.openxmlformats.org/presentationml/2006/ole">
             <mc:AlternateContent xmlns:mc="http://schemas.openxmlformats.org/markup-compatibility/2006">
               <mc:Choice xmlns:v="urn:schemas-microsoft-com:vml" Requires="v">
-                <p:oleObj spid="_x0000_s8236" name="Document" r:id="rId5" imgW="5449824" imgH="3086100" progId="Word.Document.8">
+                <p:oleObj spid="_x0000_s8243" name="Document" r:id="rId5" imgW="5449824" imgH="3086100" progId="Word.Document.8">
                   <p:embed/>
                 </p:oleObj>
               </mc:Choice>
@@ -19858,14 +20017,14 @@
                       <a:effectLst/>
                       <a:extLst>
                         <a:ext uri="{909E8E84-426E-40dd-AFC4-6F175D3DCCD1}">
-                          <a14:hiddenFill xmlns:a14="http://schemas.microsoft.com/office/drawing/2010/main" xmlns="">
+                          <a14:hiddenFill xmlns="" xmlns:a14="http://schemas.microsoft.com/office/drawing/2010/main">
                             <a:solidFill>
                               <a:srgbClr val="FFFFFF"/>
                             </a:solidFill>
                           </a14:hiddenFill>
                         </a:ext>
                         <a:ext uri="{91240B29-F687-4f45-9708-019B960494DF}">
-                          <a14:hiddenLine xmlns:a14="http://schemas.microsoft.com/office/drawing/2010/main" xmlns="" w="9525">
+                          <a14:hiddenLine xmlns="" xmlns:a14="http://schemas.microsoft.com/office/drawing/2010/main" w="9525">
                             <a:solidFill>
                               <a:srgbClr val="000000"/>
                             </a:solidFill>
@@ -19875,7 +20034,7 @@
                           </a14:hiddenLine>
                         </a:ext>
                         <a:ext uri="{AF507438-7753-43e0-B8FC-AC1667EBCBE1}">
-                          <a14:hiddenEffects xmlns:a14="http://schemas.microsoft.com/office/drawing/2010/main" xmlns="">
+                          <a14:hiddenEffects xmlns="" xmlns:a14="http://schemas.microsoft.com/office/drawing/2010/main">
                             <a:effectLst>
                               <a:outerShdw dist="35921" dir="2700000" algn="ctr" rotWithShape="0">
                                 <a:srgbClr val="808080"/>
@@ -19915,14 +20074,14 @@
           <a:effectLst/>
           <a:extLst>
             <a:ext uri="{909E8E84-426E-40dd-AFC4-6F175D3DCCD1}">
-              <a14:hiddenFill xmlns:a14="http://schemas.microsoft.com/office/drawing/2010/main" xmlns="">
+              <a14:hiddenFill xmlns="" xmlns:a14="http://schemas.microsoft.com/office/drawing/2010/main">
                 <a:solidFill>
                   <a:schemeClr val="accent1"/>
                 </a:solidFill>
               </a14:hiddenFill>
             </a:ext>
             <a:ext uri="{91240B29-F687-4f45-9708-019B960494DF}">
-              <a14:hiddenLine xmlns:a14="http://schemas.microsoft.com/office/drawing/2010/main" xmlns="" w="9525">
+              <a14:hiddenLine xmlns="" xmlns:a14="http://schemas.microsoft.com/office/drawing/2010/main" w="9525">
                 <a:solidFill>
                   <a:schemeClr val="tx1"/>
                 </a:solidFill>
@@ -19932,7 +20091,7 @@
               </a14:hiddenLine>
             </a:ext>
             <a:ext uri="{AF507438-7753-43e0-B8FC-AC1667EBCBE1}">
-              <a14:hiddenEffects xmlns:a14="http://schemas.microsoft.com/office/drawing/2010/main" xmlns="">
+              <a14:hiddenEffects xmlns="" xmlns:a14="http://schemas.microsoft.com/office/drawing/2010/main">
                 <a:effectLst>
                   <a:outerShdw dist="35921" dir="2700000" algn="ctr" rotWithShape="0">
                     <a:schemeClr val="bg2"/>
@@ -20537,14 +20696,14 @@
           <a:effectLst/>
           <a:extLst>
             <a:ext uri="{909E8E84-426E-40dd-AFC4-6F175D3DCCD1}">
-              <a14:hiddenFill xmlns:a14="http://schemas.microsoft.com/office/drawing/2010/main" xmlns="">
+              <a14:hiddenFill xmlns="" xmlns:a14="http://schemas.microsoft.com/office/drawing/2010/main">
                 <a:solidFill>
                   <a:schemeClr val="accent1"/>
                 </a:solidFill>
               </a14:hiddenFill>
             </a:ext>
             <a:ext uri="{91240B29-F687-4f45-9708-019B960494DF}">
-              <a14:hiddenLine xmlns:a14="http://schemas.microsoft.com/office/drawing/2010/main" xmlns="" w="9525">
+              <a14:hiddenLine xmlns="" xmlns:a14="http://schemas.microsoft.com/office/drawing/2010/main" w="9525">
                 <a:solidFill>
                   <a:schemeClr val="tx1"/>
                 </a:solidFill>
@@ -20554,7 +20713,7 @@
               </a14:hiddenLine>
             </a:ext>
             <a:ext uri="{AF507438-7753-43e0-B8FC-AC1667EBCBE1}">
-              <a14:hiddenEffects xmlns:a14="http://schemas.microsoft.com/office/drawing/2010/main" xmlns="">
+              <a14:hiddenEffects xmlns="" xmlns:a14="http://schemas.microsoft.com/office/drawing/2010/main">
                 <a:effectLst>
                   <a:outerShdw dist="35921" dir="2700000" algn="ctr" rotWithShape="0">
                     <a:schemeClr val="bg2"/>
@@ -20707,12 +20866,12 @@
           <a:effectLst/>
           <a:extLst>
             <a:ext uri="{909E8E84-426E-40dd-AFC4-6F175D3DCCD1}">
-              <a14:hiddenFill xmlns:a14="http://schemas.microsoft.com/office/drawing/2010/main" xmlns="">
+              <a14:hiddenFill xmlns="" xmlns:a14="http://schemas.microsoft.com/office/drawing/2010/main">
                 <a:noFill/>
               </a14:hiddenFill>
             </a:ext>
             <a:ext uri="{AF507438-7753-43e0-B8FC-AC1667EBCBE1}">
-              <a14:hiddenEffects xmlns:a14="http://schemas.microsoft.com/office/drawing/2010/main" xmlns="">
+              <a14:hiddenEffects xmlns="" xmlns:a14="http://schemas.microsoft.com/office/drawing/2010/main">
                 <a:effectLst>
                   <a:outerShdw dist="35921" dir="2700000" algn="ctr" rotWithShape="0">
                     <a:schemeClr val="bg2"/>
@@ -20753,14 +20912,14 @@
           <a:effectLst/>
           <a:extLst>
             <a:ext uri="{909E8E84-426E-40dd-AFC4-6F175D3DCCD1}">
-              <a14:hiddenFill xmlns:a14="http://schemas.microsoft.com/office/drawing/2010/main" xmlns="">
+              <a14:hiddenFill xmlns="" xmlns:a14="http://schemas.microsoft.com/office/drawing/2010/main">
                 <a:solidFill>
                   <a:schemeClr val="accent1"/>
                 </a:solidFill>
               </a14:hiddenFill>
             </a:ext>
             <a:ext uri="{91240B29-F687-4f45-9708-019B960494DF}">
-              <a14:hiddenLine xmlns:a14="http://schemas.microsoft.com/office/drawing/2010/main" xmlns="" w="9525">
+              <a14:hiddenLine xmlns="" xmlns:a14="http://schemas.microsoft.com/office/drawing/2010/main" w="9525">
                 <a:solidFill>
                   <a:schemeClr val="tx1"/>
                 </a:solidFill>
@@ -20770,7 +20929,7 @@
               </a14:hiddenLine>
             </a:ext>
             <a:ext uri="{AF507438-7753-43e0-B8FC-AC1667EBCBE1}">
-              <a14:hiddenEffects xmlns:a14="http://schemas.microsoft.com/office/drawing/2010/main" xmlns="">
+              <a14:hiddenEffects xmlns="" xmlns:a14="http://schemas.microsoft.com/office/drawing/2010/main">
                 <a:effectLst>
                   <a:outerShdw dist="35921" dir="2700000" algn="ctr" rotWithShape="0">
                     <a:schemeClr val="bg2"/>
@@ -21193,14 +21352,14 @@
           </a:ln>
           <a:extLst>
             <a:ext uri="{909E8E84-426E-40dd-AFC4-6F175D3DCCD1}">
-              <a14:hiddenFill xmlns:a14="http://schemas.microsoft.com/office/drawing/2010/main" xmlns="">
+              <a14:hiddenFill xmlns="" xmlns:a14="http://schemas.microsoft.com/office/drawing/2010/main">
                 <a:solidFill>
                   <a:srgbClr val="FFFFFF"/>
                 </a:solidFill>
               </a14:hiddenFill>
             </a:ext>
             <a:ext uri="{91240B29-F687-4f45-9708-019B960494DF}">
-              <a14:hiddenLine xmlns:a14="http://schemas.microsoft.com/office/drawing/2010/main" xmlns="" w="9525">
+              <a14:hiddenLine xmlns="" xmlns:a14="http://schemas.microsoft.com/office/drawing/2010/main" w="9525">
                 <a:solidFill>
                   <a:srgbClr val="000000"/>
                 </a:solidFill>
@@ -21633,14 +21792,14 @@
           <a:effectLst/>
           <a:extLst>
             <a:ext uri="{909E8E84-426E-40dd-AFC4-6F175D3DCCD1}">
-              <a14:hiddenFill xmlns:a14="http://schemas.microsoft.com/office/drawing/2010/main" xmlns="">
+              <a14:hiddenFill xmlns="" xmlns:a14="http://schemas.microsoft.com/office/drawing/2010/main">
                 <a:solidFill>
                   <a:schemeClr val="accent1"/>
                 </a:solidFill>
               </a14:hiddenFill>
             </a:ext>
             <a:ext uri="{91240B29-F687-4f45-9708-019B960494DF}">
-              <a14:hiddenLine xmlns:a14="http://schemas.microsoft.com/office/drawing/2010/main" xmlns="" w="9525">
+              <a14:hiddenLine xmlns="" xmlns:a14="http://schemas.microsoft.com/office/drawing/2010/main" w="9525">
                 <a:solidFill>
                   <a:schemeClr val="tx1"/>
                 </a:solidFill>
@@ -21650,7 +21809,7 @@
               </a14:hiddenLine>
             </a:ext>
             <a:ext uri="{AF507438-7753-43e0-B8FC-AC1667EBCBE1}">
-              <a14:hiddenEffects xmlns:a14="http://schemas.microsoft.com/office/drawing/2010/main" xmlns="">
+              <a14:hiddenEffects xmlns="" xmlns:a14="http://schemas.microsoft.com/office/drawing/2010/main">
                 <a:effectLst>
                   <a:outerShdw dist="35921" dir="2700000" algn="ctr" rotWithShape="0">
                     <a:schemeClr val="bg2"/>
@@ -21803,12 +21962,12 @@
           <a:effectLst/>
           <a:extLst>
             <a:ext uri="{909E8E84-426E-40dd-AFC4-6F175D3DCCD1}">
-              <a14:hiddenFill xmlns:a14="http://schemas.microsoft.com/office/drawing/2010/main" xmlns="">
+              <a14:hiddenFill xmlns="" xmlns:a14="http://schemas.microsoft.com/office/drawing/2010/main">
                 <a:noFill/>
               </a14:hiddenFill>
             </a:ext>
             <a:ext uri="{AF507438-7753-43e0-B8FC-AC1667EBCBE1}">
-              <a14:hiddenEffects xmlns:a14="http://schemas.microsoft.com/office/drawing/2010/main" xmlns="">
+              <a14:hiddenEffects xmlns="" xmlns:a14="http://schemas.microsoft.com/office/drawing/2010/main">
                 <a:effectLst>
                   <a:outerShdw dist="35921" dir="2700000" algn="ctr" rotWithShape="0">
                     <a:schemeClr val="bg2"/>
@@ -21849,14 +22008,14 @@
           <a:effectLst/>
           <a:extLst>
             <a:ext uri="{909E8E84-426E-40dd-AFC4-6F175D3DCCD1}">
-              <a14:hiddenFill xmlns:a14="http://schemas.microsoft.com/office/drawing/2010/main" xmlns="">
+              <a14:hiddenFill xmlns="" xmlns:a14="http://schemas.microsoft.com/office/drawing/2010/main">
                 <a:solidFill>
                   <a:schemeClr val="accent1"/>
                 </a:solidFill>
               </a14:hiddenFill>
             </a:ext>
             <a:ext uri="{91240B29-F687-4f45-9708-019B960494DF}">
-              <a14:hiddenLine xmlns:a14="http://schemas.microsoft.com/office/drawing/2010/main" xmlns="" w="9525">
+              <a14:hiddenLine xmlns="" xmlns:a14="http://schemas.microsoft.com/office/drawing/2010/main" w="9525">
                 <a:solidFill>
                   <a:schemeClr val="tx1"/>
                 </a:solidFill>
@@ -21866,7 +22025,7 @@
               </a14:hiddenLine>
             </a:ext>
             <a:ext uri="{AF507438-7753-43e0-B8FC-AC1667EBCBE1}">
-              <a14:hiddenEffects xmlns:a14="http://schemas.microsoft.com/office/drawing/2010/main" xmlns="">
+              <a14:hiddenEffects xmlns="" xmlns:a14="http://schemas.microsoft.com/office/drawing/2010/main">
                 <a:effectLst>
                   <a:outerShdw dist="35921" dir="2700000" algn="ctr" rotWithShape="0">
                     <a:schemeClr val="bg2"/>
@@ -22691,14 +22850,14 @@
           <a:effectLst/>
           <a:extLst>
             <a:ext uri="{909E8E84-426E-40dd-AFC4-6F175D3DCCD1}">
-              <a14:hiddenFill xmlns:a14="http://schemas.microsoft.com/office/drawing/2010/main" xmlns="">
+              <a14:hiddenFill xmlns="" xmlns:a14="http://schemas.microsoft.com/office/drawing/2010/main">
                 <a:solidFill>
                   <a:schemeClr val="accent1"/>
                 </a:solidFill>
               </a14:hiddenFill>
             </a:ext>
             <a:ext uri="{91240B29-F687-4f45-9708-019B960494DF}">
-              <a14:hiddenLine xmlns:a14="http://schemas.microsoft.com/office/drawing/2010/main" xmlns="" w="9525">
+              <a14:hiddenLine xmlns="" xmlns:a14="http://schemas.microsoft.com/office/drawing/2010/main" w="9525">
                 <a:solidFill>
                   <a:schemeClr val="tx1"/>
                 </a:solidFill>
@@ -22708,7 +22867,7 @@
               </a14:hiddenLine>
             </a:ext>
             <a:ext uri="{AF507438-7753-43e0-B8FC-AC1667EBCBE1}">
-              <a14:hiddenEffects xmlns:a14="http://schemas.microsoft.com/office/drawing/2010/main" xmlns="">
+              <a14:hiddenEffects xmlns="" xmlns:a14="http://schemas.microsoft.com/office/drawing/2010/main">
                 <a:effectLst>
                   <a:outerShdw dist="35921" dir="2700000" algn="ctr" rotWithShape="0">
                     <a:schemeClr val="bg2"/>
@@ -22861,12 +23020,12 @@
           <a:effectLst/>
           <a:extLst>
             <a:ext uri="{909E8E84-426E-40dd-AFC4-6F175D3DCCD1}">
-              <a14:hiddenFill xmlns:a14="http://schemas.microsoft.com/office/drawing/2010/main" xmlns="">
+              <a14:hiddenFill xmlns="" xmlns:a14="http://schemas.microsoft.com/office/drawing/2010/main">
                 <a:noFill/>
               </a14:hiddenFill>
             </a:ext>
             <a:ext uri="{AF507438-7753-43e0-B8FC-AC1667EBCBE1}">
-              <a14:hiddenEffects xmlns:a14="http://schemas.microsoft.com/office/drawing/2010/main" xmlns="">
+              <a14:hiddenEffects xmlns="" xmlns:a14="http://schemas.microsoft.com/office/drawing/2010/main">
                 <a:effectLst>
                   <a:outerShdw dist="35921" dir="2700000" algn="ctr" rotWithShape="0">
                     <a:schemeClr val="bg2"/>
@@ -22907,14 +23066,14 @@
           <a:effectLst/>
           <a:extLst>
             <a:ext uri="{909E8E84-426E-40dd-AFC4-6F175D3DCCD1}">
-              <a14:hiddenFill xmlns:a14="http://schemas.microsoft.com/office/drawing/2010/main" xmlns="">
+              <a14:hiddenFill xmlns="" xmlns:a14="http://schemas.microsoft.com/office/drawing/2010/main">
                 <a:solidFill>
                   <a:schemeClr val="accent1"/>
                 </a:solidFill>
               </a14:hiddenFill>
             </a:ext>
             <a:ext uri="{91240B29-F687-4f45-9708-019B960494DF}">
-              <a14:hiddenLine xmlns:a14="http://schemas.microsoft.com/office/drawing/2010/main" xmlns="" w="9525">
+              <a14:hiddenLine xmlns="" xmlns:a14="http://schemas.microsoft.com/office/drawing/2010/main" w="9525">
                 <a:solidFill>
                   <a:schemeClr val="tx1"/>
                 </a:solidFill>
@@ -22924,7 +23083,7 @@
               </a14:hiddenLine>
             </a:ext>
             <a:ext uri="{AF507438-7753-43e0-B8FC-AC1667EBCBE1}">
-              <a14:hiddenEffects xmlns:a14="http://schemas.microsoft.com/office/drawing/2010/main" xmlns="">
+              <a14:hiddenEffects xmlns="" xmlns:a14="http://schemas.microsoft.com/office/drawing/2010/main">
                 <a:effectLst>
                   <a:outerShdw dist="35921" dir="2700000" algn="ctr" rotWithShape="0">
                     <a:schemeClr val="bg2"/>
@@ -23279,7 +23438,7 @@
           <a:graphicData uri="http://schemas.openxmlformats.org/presentationml/2006/ole">
             <mc:AlternateContent xmlns:mc="http://schemas.openxmlformats.org/markup-compatibility/2006">
               <mc:Choice xmlns:v="urn:schemas-microsoft-com:vml" Requires="v">
-                <p:oleObj spid="_x0000_s11290" name="Equation" r:id="rId3" imgW="253890" imgH="279279" progId="Equation.3">
+                <p:oleObj spid="_x0000_s11294" name="Equation" r:id="rId3" imgW="253890" imgH="279279" progId="Equation.3">
                   <p:embed/>
                 </p:oleObj>
               </mc:Choice>
@@ -23322,14 +23481,14 @@
                       <a:effectLst/>
                       <a:extLst>
                         <a:ext uri="{909E8E84-426E-40dd-AFC4-6F175D3DCCD1}">
-                          <a14:hiddenFill xmlns:a14="http://schemas.microsoft.com/office/drawing/2010/main" xmlns="">
+                          <a14:hiddenFill xmlns="" xmlns:a14="http://schemas.microsoft.com/office/drawing/2010/main">
                             <a:solidFill>
                               <a:srgbClr val="FFFFFF"/>
                             </a:solidFill>
                           </a14:hiddenFill>
                         </a:ext>
                         <a:ext uri="{91240B29-F687-4f45-9708-019B960494DF}">
-                          <a14:hiddenLine xmlns:a14="http://schemas.microsoft.com/office/drawing/2010/main" xmlns="" w="9525">
+                          <a14:hiddenLine xmlns="" xmlns:a14="http://schemas.microsoft.com/office/drawing/2010/main" w="9525">
                             <a:solidFill>
                               <a:srgbClr val="000000"/>
                             </a:solidFill>
@@ -23339,7 +23498,7 @@
                           </a14:hiddenLine>
                         </a:ext>
                         <a:ext uri="{AF507438-7753-43e0-B8FC-AC1667EBCBE1}">
-                          <a14:hiddenEffects xmlns:a14="http://schemas.microsoft.com/office/drawing/2010/main" xmlns="">
+                          <a14:hiddenEffects xmlns="" xmlns:a14="http://schemas.microsoft.com/office/drawing/2010/main">
                             <a:effectLst>
                               <a:outerShdw dist="35921" dir="2700000" algn="ctr" rotWithShape="0">
                                 <a:srgbClr val="808080"/>
@@ -23777,14 +23936,14 @@
           <a:effectLst/>
           <a:extLst>
             <a:ext uri="{909E8E84-426E-40dd-AFC4-6F175D3DCCD1}">
-              <a14:hiddenFill xmlns:a14="http://schemas.microsoft.com/office/drawing/2010/main" xmlns="">
+              <a14:hiddenFill xmlns="" xmlns:a14="http://schemas.microsoft.com/office/drawing/2010/main">
                 <a:solidFill>
                   <a:schemeClr val="accent1"/>
                 </a:solidFill>
               </a14:hiddenFill>
             </a:ext>
             <a:ext uri="{91240B29-F687-4f45-9708-019B960494DF}">
-              <a14:hiddenLine xmlns:a14="http://schemas.microsoft.com/office/drawing/2010/main" xmlns="" w="9525">
+              <a14:hiddenLine xmlns="" xmlns:a14="http://schemas.microsoft.com/office/drawing/2010/main" w="9525">
                 <a:solidFill>
                   <a:schemeClr val="tx1"/>
                 </a:solidFill>
@@ -23794,7 +23953,7 @@
               </a14:hiddenLine>
             </a:ext>
             <a:ext uri="{AF507438-7753-43e0-B8FC-AC1667EBCBE1}">
-              <a14:hiddenEffects xmlns:a14="http://schemas.microsoft.com/office/drawing/2010/main" xmlns="">
+              <a14:hiddenEffects xmlns="" xmlns:a14="http://schemas.microsoft.com/office/drawing/2010/main">
                 <a:effectLst>
                   <a:outerShdw dist="35921" dir="2700000" algn="ctr" rotWithShape="0">
                     <a:schemeClr val="bg2"/>
@@ -23947,12 +24106,12 @@
           <a:effectLst/>
           <a:extLst>
             <a:ext uri="{909E8E84-426E-40dd-AFC4-6F175D3DCCD1}">
-              <a14:hiddenFill xmlns:a14="http://schemas.microsoft.com/office/drawing/2010/main" xmlns="">
+              <a14:hiddenFill xmlns="" xmlns:a14="http://schemas.microsoft.com/office/drawing/2010/main">
                 <a:noFill/>
               </a14:hiddenFill>
             </a:ext>
             <a:ext uri="{AF507438-7753-43e0-B8FC-AC1667EBCBE1}">
-              <a14:hiddenEffects xmlns:a14="http://schemas.microsoft.com/office/drawing/2010/main" xmlns="">
+              <a14:hiddenEffects xmlns="" xmlns:a14="http://schemas.microsoft.com/office/drawing/2010/main">
                 <a:effectLst>
                   <a:outerShdw dist="35921" dir="2700000" algn="ctr" rotWithShape="0">
                     <a:schemeClr val="bg2"/>
@@ -23993,14 +24152,14 @@
           <a:effectLst/>
           <a:extLst>
             <a:ext uri="{909E8E84-426E-40dd-AFC4-6F175D3DCCD1}">
-              <a14:hiddenFill xmlns:a14="http://schemas.microsoft.com/office/drawing/2010/main" xmlns="">
+              <a14:hiddenFill xmlns="" xmlns:a14="http://schemas.microsoft.com/office/drawing/2010/main">
                 <a:solidFill>
                   <a:schemeClr val="accent1"/>
                 </a:solidFill>
               </a14:hiddenFill>
             </a:ext>
             <a:ext uri="{91240B29-F687-4f45-9708-019B960494DF}">
-              <a14:hiddenLine xmlns:a14="http://schemas.microsoft.com/office/drawing/2010/main" xmlns="" w="9525">
+              <a14:hiddenLine xmlns="" xmlns:a14="http://schemas.microsoft.com/office/drawing/2010/main" w="9525">
                 <a:solidFill>
                   <a:schemeClr val="tx1"/>
                 </a:solidFill>
@@ -24010,7 +24169,7 @@
               </a14:hiddenLine>
             </a:ext>
             <a:ext uri="{AF507438-7753-43e0-B8FC-AC1667EBCBE1}">
-              <a14:hiddenEffects xmlns:a14="http://schemas.microsoft.com/office/drawing/2010/main" xmlns="">
+              <a14:hiddenEffects xmlns="" xmlns:a14="http://schemas.microsoft.com/office/drawing/2010/main">
                 <a:effectLst>
                   <a:outerShdw dist="35921" dir="2700000" algn="ctr" rotWithShape="0">
                     <a:schemeClr val="bg2"/>
@@ -24368,7 +24527,7 @@
           <a:graphicData uri="http://schemas.openxmlformats.org/presentationml/2006/ole">
             <mc:AlternateContent xmlns:mc="http://schemas.openxmlformats.org/markup-compatibility/2006">
               <mc:Choice xmlns:v="urn:schemas-microsoft-com:vml" Requires="v">
-                <p:oleObj spid="_x0000_s12346" name="Equation" r:id="rId3" imgW="1714500" imgH="647700" progId="Equation.3">
+                <p:oleObj spid="_x0000_s12356" name="Equation" r:id="rId3" imgW="1714500" imgH="647700" progId="Equation.3">
                   <p:embed/>
                 </p:oleObj>
               </mc:Choice>
@@ -24411,14 +24570,14 @@
                       <a:effectLst/>
                       <a:extLst>
                         <a:ext uri="{909E8E84-426E-40dd-AFC4-6F175D3DCCD1}">
-                          <a14:hiddenFill xmlns:a14="http://schemas.microsoft.com/office/drawing/2010/main" xmlns="">
+                          <a14:hiddenFill xmlns="" xmlns:a14="http://schemas.microsoft.com/office/drawing/2010/main">
                             <a:solidFill>
                               <a:srgbClr val="FFFFFF"/>
                             </a:solidFill>
                           </a14:hiddenFill>
                         </a:ext>
                         <a:ext uri="{91240B29-F687-4f45-9708-019B960494DF}">
-                          <a14:hiddenLine xmlns:a14="http://schemas.microsoft.com/office/drawing/2010/main" xmlns="" w="9525">
+                          <a14:hiddenLine xmlns="" xmlns:a14="http://schemas.microsoft.com/office/drawing/2010/main" w="9525">
                             <a:solidFill>
                               <a:srgbClr val="000000"/>
                             </a:solidFill>
@@ -24428,7 +24587,7 @@
                           </a14:hiddenLine>
                         </a:ext>
                         <a:ext uri="{AF507438-7753-43e0-B8FC-AC1667EBCBE1}">
-                          <a14:hiddenEffects xmlns:a14="http://schemas.microsoft.com/office/drawing/2010/main" xmlns="">
+                          <a14:hiddenEffects xmlns="" xmlns:a14="http://schemas.microsoft.com/office/drawing/2010/main">
                             <a:effectLst>
                               <a:outerShdw dist="35921" dir="2700000" algn="ctr" rotWithShape="0">
                                 <a:srgbClr val="808080"/>
@@ -24461,7 +24620,7 @@
           <a:graphicData uri="http://schemas.openxmlformats.org/presentationml/2006/ole">
             <mc:AlternateContent xmlns:mc="http://schemas.openxmlformats.org/markup-compatibility/2006">
               <mc:Choice xmlns:v="urn:schemas-microsoft-com:vml" Requires="v">
-                <p:oleObj spid="_x0000_s12347" name="Equation" r:id="rId5" imgW="838200" imgH="711200" progId="Equation.3">
+                <p:oleObj spid="_x0000_s12357" name="Equation" r:id="rId5" imgW="838200" imgH="711200" progId="Equation.3">
                   <p:embed/>
                 </p:oleObj>
               </mc:Choice>
@@ -24504,14 +24663,14 @@
                       <a:effectLst/>
                       <a:extLst>
                         <a:ext uri="{909E8E84-426E-40dd-AFC4-6F175D3DCCD1}">
-                          <a14:hiddenFill xmlns:a14="http://schemas.microsoft.com/office/drawing/2010/main" xmlns="">
+                          <a14:hiddenFill xmlns="" xmlns:a14="http://schemas.microsoft.com/office/drawing/2010/main">
                             <a:solidFill>
                               <a:srgbClr val="FFFFFF"/>
                             </a:solidFill>
                           </a14:hiddenFill>
                         </a:ext>
                         <a:ext uri="{91240B29-F687-4f45-9708-019B960494DF}">
-                          <a14:hiddenLine xmlns:a14="http://schemas.microsoft.com/office/drawing/2010/main" xmlns="" w="9525">
+                          <a14:hiddenLine xmlns="" xmlns:a14="http://schemas.microsoft.com/office/drawing/2010/main" w="9525">
                             <a:solidFill>
                               <a:srgbClr val="000000"/>
                             </a:solidFill>
@@ -24521,7 +24680,7 @@
                           </a14:hiddenLine>
                         </a:ext>
                         <a:ext uri="{AF507438-7753-43e0-B8FC-AC1667EBCBE1}">
-                          <a14:hiddenEffects xmlns:a14="http://schemas.microsoft.com/office/drawing/2010/main" xmlns="">
+                          <a14:hiddenEffects xmlns="" xmlns:a14="http://schemas.microsoft.com/office/drawing/2010/main">
                             <a:effectLst>
                               <a:outerShdw dist="35921" dir="2700000" algn="ctr" rotWithShape="0">
                                 <a:srgbClr val="808080"/>
@@ -24554,7 +24713,7 @@
           <a:graphicData uri="http://schemas.openxmlformats.org/presentationml/2006/ole">
             <mc:AlternateContent xmlns:mc="http://schemas.openxmlformats.org/markup-compatibility/2006">
               <mc:Choice xmlns:v="urn:schemas-microsoft-com:vml" Requires="v">
-                <p:oleObj spid="_x0000_s12348" name="Equation" r:id="rId7" imgW="2184400" imgH="1320800" progId="Equation.3">
+                <p:oleObj spid="_x0000_s12358" name="Equation" r:id="rId7" imgW="2184400" imgH="1320800" progId="Equation.3">
                   <p:embed/>
                 </p:oleObj>
               </mc:Choice>
@@ -24597,14 +24756,14 @@
                       <a:effectLst/>
                       <a:extLst>
                         <a:ext uri="{909E8E84-426E-40dd-AFC4-6F175D3DCCD1}">
-                          <a14:hiddenFill xmlns:a14="http://schemas.microsoft.com/office/drawing/2010/main" xmlns="">
+                          <a14:hiddenFill xmlns="" xmlns:a14="http://schemas.microsoft.com/office/drawing/2010/main">
                             <a:solidFill>
                               <a:srgbClr val="FFFFFF"/>
                             </a:solidFill>
                           </a14:hiddenFill>
                         </a:ext>
                         <a:ext uri="{91240B29-F687-4f45-9708-019B960494DF}">
-                          <a14:hiddenLine xmlns:a14="http://schemas.microsoft.com/office/drawing/2010/main" xmlns="" w="9525">
+                          <a14:hiddenLine xmlns="" xmlns:a14="http://schemas.microsoft.com/office/drawing/2010/main" w="9525">
                             <a:solidFill>
                               <a:srgbClr val="000000"/>
                             </a:solidFill>
@@ -24614,7 +24773,7 @@
                           </a14:hiddenLine>
                         </a:ext>
                         <a:ext uri="{AF507438-7753-43e0-B8FC-AC1667EBCBE1}">
-                          <a14:hiddenEffects xmlns:a14="http://schemas.microsoft.com/office/drawing/2010/main" xmlns="">
+                          <a14:hiddenEffects xmlns="" xmlns:a14="http://schemas.microsoft.com/office/drawing/2010/main">
                             <a:effectLst>
                               <a:outerShdw dist="35921" dir="2700000" algn="ctr" rotWithShape="0">
                                 <a:srgbClr val="808080"/>
@@ -24896,7 +25055,7 @@
         <a:effectLst/>
         <a:extLst>
           <a:ext uri="{AF507438-7753-43e0-B8FC-AC1667EBCBE1}">
-            <a14:hiddenEffects xmlns:a14="http://schemas.microsoft.com/office/drawing/2010/main" xmlns="">
+            <a14:hiddenEffects xmlns="" xmlns:a14="http://schemas.microsoft.com/office/drawing/2010/main">
               <a:effectLst>
                 <a:outerShdw dist="35921" dir="2700000" algn="ctr" rotWithShape="0">
                   <a:schemeClr val="bg2"/>
@@ -24969,7 +25128,7 @@
         <a:effectLst/>
         <a:extLst>
           <a:ext uri="{AF507438-7753-43e0-B8FC-AC1667EBCBE1}">
-            <a14:hiddenEffects xmlns:a14="http://schemas.microsoft.com/office/drawing/2010/main" xmlns="">
+            <a14:hiddenEffects xmlns="" xmlns:a14="http://schemas.microsoft.com/office/drawing/2010/main">
               <a:effectLst>
                 <a:outerShdw dist="35921" dir="2700000" algn="ctr" rotWithShape="0">
                   <a:schemeClr val="bg2"/>

</xml_diff>